<commit_message>
Added current status to december monthly ppt
</commit_message>
<xml_diff>
--- a/1_Orga/1_Monthly_Updates/A4D_Monthly_Update_December.pptx
+++ b/1_Orga/1_Monthly_Updates/A4D_Monthly_Update_December.pptx
@@ -5,7 +5,7 @@
     <p:sldMasterId id="2147483648" r:id="rId1"/>
   </p:sldMasterIdLst>
   <p:notesMasterIdLst>
-    <p:notesMasterId r:id="rId13"/>
+    <p:notesMasterId r:id="rId14"/>
   </p:notesMasterIdLst>
   <p:sldIdLst>
     <p:sldId id="256" r:id="rId2"/>
@@ -18,7 +18,8 @@
     <p:sldId id="265" r:id="rId9"/>
     <p:sldId id="266" r:id="rId10"/>
     <p:sldId id="262" r:id="rId11"/>
-    <p:sldId id="267" r:id="rId12"/>
+    <p:sldId id="269" r:id="rId12"/>
+    <p:sldId id="267" r:id="rId13"/>
   </p:sldIdLst>
   <p:sldSz cx="12192000" cy="6858000"/>
   <p:notesSz cx="6858000" cy="9144000"/>
@@ -873,6 +874,753 @@
 </file>
 
 <file path=ppt/diagrams/colors2.xml><?xml version="1.0" encoding="utf-8"?>
+<dgm:colorsDef xmlns:dgm="http://schemas.openxmlformats.org/drawingml/2006/diagram" xmlns:a="http://schemas.openxmlformats.org/drawingml/2006/main" uniqueId="urn:microsoft.com/office/officeart/2005/8/colors/accent1_2">
+  <dgm:title val=""/>
+  <dgm:desc val=""/>
+  <dgm:catLst>
+    <dgm:cat type="accent1" pri="11200"/>
+  </dgm:catLst>
+  <dgm:styleLbl name="node0">
+    <dgm:fillClrLst meth="repeat">
+      <a:schemeClr val="accent1"/>
+    </dgm:fillClrLst>
+    <dgm:linClrLst meth="repeat">
+      <a:schemeClr val="lt1"/>
+    </dgm:linClrLst>
+    <dgm:effectClrLst/>
+    <dgm:txLinClrLst/>
+    <dgm:txFillClrLst/>
+    <dgm:txEffectClrLst/>
+  </dgm:styleLbl>
+  <dgm:styleLbl name="alignNode1">
+    <dgm:fillClrLst meth="repeat">
+      <a:schemeClr val="accent1"/>
+    </dgm:fillClrLst>
+    <dgm:linClrLst meth="repeat">
+      <a:schemeClr val="accent1"/>
+    </dgm:linClrLst>
+    <dgm:effectClrLst/>
+    <dgm:txLinClrLst/>
+    <dgm:txFillClrLst/>
+    <dgm:txEffectClrLst/>
+  </dgm:styleLbl>
+  <dgm:styleLbl name="node1">
+    <dgm:fillClrLst meth="repeat">
+      <a:schemeClr val="accent1"/>
+    </dgm:fillClrLst>
+    <dgm:linClrLst meth="repeat">
+      <a:schemeClr val="lt1"/>
+    </dgm:linClrLst>
+    <dgm:effectClrLst/>
+    <dgm:txLinClrLst/>
+    <dgm:txFillClrLst/>
+    <dgm:txEffectClrLst/>
+  </dgm:styleLbl>
+  <dgm:styleLbl name="lnNode1">
+    <dgm:fillClrLst meth="repeat">
+      <a:schemeClr val="accent1"/>
+    </dgm:fillClrLst>
+    <dgm:linClrLst meth="repeat">
+      <a:schemeClr val="lt1"/>
+    </dgm:linClrLst>
+    <dgm:effectClrLst/>
+    <dgm:txLinClrLst/>
+    <dgm:txFillClrLst/>
+    <dgm:txEffectClrLst/>
+  </dgm:styleLbl>
+  <dgm:styleLbl name="vennNode1">
+    <dgm:fillClrLst meth="repeat">
+      <a:schemeClr val="accent1">
+        <a:alpha val="50000"/>
+      </a:schemeClr>
+    </dgm:fillClrLst>
+    <dgm:linClrLst meth="repeat">
+      <a:schemeClr val="lt1"/>
+    </dgm:linClrLst>
+    <dgm:effectClrLst/>
+    <dgm:txLinClrLst/>
+    <dgm:txFillClrLst/>
+    <dgm:txEffectClrLst/>
+  </dgm:styleLbl>
+  <dgm:styleLbl name="node2">
+    <dgm:fillClrLst meth="repeat">
+      <a:schemeClr val="accent1"/>
+    </dgm:fillClrLst>
+    <dgm:linClrLst meth="repeat">
+      <a:schemeClr val="lt1"/>
+    </dgm:linClrLst>
+    <dgm:effectClrLst/>
+    <dgm:txLinClrLst/>
+    <dgm:txFillClrLst/>
+    <dgm:txEffectClrLst/>
+  </dgm:styleLbl>
+  <dgm:styleLbl name="node3">
+    <dgm:fillClrLst meth="repeat">
+      <a:schemeClr val="accent1"/>
+    </dgm:fillClrLst>
+    <dgm:linClrLst meth="repeat">
+      <a:schemeClr val="lt1"/>
+    </dgm:linClrLst>
+    <dgm:effectClrLst/>
+    <dgm:txLinClrLst/>
+    <dgm:txFillClrLst/>
+    <dgm:txEffectClrLst/>
+  </dgm:styleLbl>
+  <dgm:styleLbl name="node4">
+    <dgm:fillClrLst meth="repeat">
+      <a:schemeClr val="accent1"/>
+    </dgm:fillClrLst>
+    <dgm:linClrLst meth="repeat">
+      <a:schemeClr val="lt1"/>
+    </dgm:linClrLst>
+    <dgm:effectClrLst/>
+    <dgm:txLinClrLst/>
+    <dgm:txFillClrLst/>
+    <dgm:txEffectClrLst/>
+  </dgm:styleLbl>
+  <dgm:styleLbl name="fgImgPlace1">
+    <dgm:fillClrLst meth="repeat">
+      <a:schemeClr val="accent1">
+        <a:tint val="50000"/>
+      </a:schemeClr>
+    </dgm:fillClrLst>
+    <dgm:linClrLst meth="repeat">
+      <a:schemeClr val="lt1"/>
+    </dgm:linClrLst>
+    <dgm:effectClrLst/>
+    <dgm:txLinClrLst/>
+    <dgm:txFillClrLst meth="repeat">
+      <a:schemeClr val="lt1"/>
+    </dgm:txFillClrLst>
+    <dgm:txEffectClrLst/>
+  </dgm:styleLbl>
+  <dgm:styleLbl name="alignImgPlace1">
+    <dgm:fillClrLst meth="repeat">
+      <a:schemeClr val="accent1">
+        <a:tint val="50000"/>
+      </a:schemeClr>
+    </dgm:fillClrLst>
+    <dgm:linClrLst meth="repeat">
+      <a:schemeClr val="lt1"/>
+    </dgm:linClrLst>
+    <dgm:effectClrLst/>
+    <dgm:txLinClrLst/>
+    <dgm:txFillClrLst meth="repeat">
+      <a:schemeClr val="lt1"/>
+    </dgm:txFillClrLst>
+    <dgm:txEffectClrLst/>
+  </dgm:styleLbl>
+  <dgm:styleLbl name="bgImgPlace1">
+    <dgm:fillClrLst meth="repeat">
+      <a:schemeClr val="accent1">
+        <a:tint val="50000"/>
+      </a:schemeClr>
+    </dgm:fillClrLst>
+    <dgm:linClrLst meth="repeat">
+      <a:schemeClr val="lt1"/>
+    </dgm:linClrLst>
+    <dgm:effectClrLst/>
+    <dgm:txLinClrLst/>
+    <dgm:txFillClrLst meth="repeat">
+      <a:schemeClr val="lt1"/>
+    </dgm:txFillClrLst>
+    <dgm:txEffectClrLst/>
+  </dgm:styleLbl>
+  <dgm:styleLbl name="sibTrans2D1">
+    <dgm:fillClrLst meth="repeat">
+      <a:schemeClr val="accent1">
+        <a:tint val="60000"/>
+      </a:schemeClr>
+    </dgm:fillClrLst>
+    <dgm:linClrLst meth="repeat">
+      <a:schemeClr val="accent1">
+        <a:tint val="60000"/>
+      </a:schemeClr>
+    </dgm:linClrLst>
+    <dgm:effectClrLst/>
+    <dgm:txLinClrLst/>
+    <dgm:txFillClrLst/>
+    <dgm:txEffectClrLst/>
+  </dgm:styleLbl>
+  <dgm:styleLbl name="fgSibTrans2D1">
+    <dgm:fillClrLst meth="repeat">
+      <a:schemeClr val="accent1">
+        <a:tint val="60000"/>
+      </a:schemeClr>
+    </dgm:fillClrLst>
+    <dgm:linClrLst meth="repeat">
+      <a:schemeClr val="accent1">
+        <a:tint val="60000"/>
+      </a:schemeClr>
+    </dgm:linClrLst>
+    <dgm:effectClrLst/>
+    <dgm:txLinClrLst/>
+    <dgm:txFillClrLst/>
+    <dgm:txEffectClrLst/>
+  </dgm:styleLbl>
+  <dgm:styleLbl name="bgSibTrans2D1">
+    <dgm:fillClrLst meth="repeat">
+      <a:schemeClr val="accent1">
+        <a:tint val="60000"/>
+      </a:schemeClr>
+    </dgm:fillClrLst>
+    <dgm:linClrLst meth="repeat">
+      <a:schemeClr val="accent1">
+        <a:tint val="60000"/>
+      </a:schemeClr>
+    </dgm:linClrLst>
+    <dgm:effectClrLst/>
+    <dgm:txLinClrLst/>
+    <dgm:txFillClrLst/>
+    <dgm:txEffectClrLst/>
+  </dgm:styleLbl>
+  <dgm:styleLbl name="sibTrans1D1">
+    <dgm:fillClrLst meth="repeat">
+      <a:schemeClr val="accent1"/>
+    </dgm:fillClrLst>
+    <dgm:linClrLst meth="repeat">
+      <a:schemeClr val="accent1"/>
+    </dgm:linClrLst>
+    <dgm:effectClrLst/>
+    <dgm:txLinClrLst/>
+    <dgm:txFillClrLst meth="repeat">
+      <a:schemeClr val="tx1"/>
+    </dgm:txFillClrLst>
+    <dgm:txEffectClrLst/>
+  </dgm:styleLbl>
+  <dgm:styleLbl name="callout">
+    <dgm:fillClrLst meth="repeat">
+      <a:schemeClr val="accent1"/>
+    </dgm:fillClrLst>
+    <dgm:linClrLst meth="repeat">
+      <a:schemeClr val="accent1">
+        <a:tint val="50000"/>
+      </a:schemeClr>
+    </dgm:linClrLst>
+    <dgm:effectClrLst/>
+    <dgm:txLinClrLst/>
+    <dgm:txFillClrLst meth="repeat">
+      <a:schemeClr val="tx1"/>
+    </dgm:txFillClrLst>
+    <dgm:txEffectClrLst/>
+  </dgm:styleLbl>
+  <dgm:styleLbl name="asst0">
+    <dgm:fillClrLst meth="repeat">
+      <a:schemeClr val="accent1"/>
+    </dgm:fillClrLst>
+    <dgm:linClrLst meth="repeat">
+      <a:schemeClr val="lt1"/>
+    </dgm:linClrLst>
+    <dgm:effectClrLst/>
+    <dgm:txLinClrLst/>
+    <dgm:txFillClrLst/>
+    <dgm:txEffectClrLst/>
+  </dgm:styleLbl>
+  <dgm:styleLbl name="asst1">
+    <dgm:fillClrLst meth="repeat">
+      <a:schemeClr val="accent1"/>
+    </dgm:fillClrLst>
+    <dgm:linClrLst meth="repeat">
+      <a:schemeClr val="lt1"/>
+    </dgm:linClrLst>
+    <dgm:effectClrLst/>
+    <dgm:txLinClrLst/>
+    <dgm:txFillClrLst/>
+    <dgm:txEffectClrLst/>
+  </dgm:styleLbl>
+  <dgm:styleLbl name="asst2">
+    <dgm:fillClrLst meth="repeat">
+      <a:schemeClr val="accent1"/>
+    </dgm:fillClrLst>
+    <dgm:linClrLst meth="repeat">
+      <a:schemeClr val="lt1"/>
+    </dgm:linClrLst>
+    <dgm:effectClrLst/>
+    <dgm:txLinClrLst/>
+    <dgm:txFillClrLst/>
+    <dgm:txEffectClrLst/>
+  </dgm:styleLbl>
+  <dgm:styleLbl name="asst3">
+    <dgm:fillClrLst meth="repeat">
+      <a:schemeClr val="accent1"/>
+    </dgm:fillClrLst>
+    <dgm:linClrLst meth="repeat">
+      <a:schemeClr val="lt1"/>
+    </dgm:linClrLst>
+    <dgm:effectClrLst/>
+    <dgm:txLinClrLst/>
+    <dgm:txFillClrLst/>
+    <dgm:txEffectClrLst/>
+  </dgm:styleLbl>
+  <dgm:styleLbl name="asst4">
+    <dgm:fillClrLst meth="repeat">
+      <a:schemeClr val="accent1"/>
+    </dgm:fillClrLst>
+    <dgm:linClrLst meth="repeat">
+      <a:schemeClr val="lt1"/>
+    </dgm:linClrLst>
+    <dgm:effectClrLst/>
+    <dgm:txLinClrLst/>
+    <dgm:txFillClrLst/>
+    <dgm:txEffectClrLst/>
+  </dgm:styleLbl>
+  <dgm:styleLbl name="parChTrans2D1">
+    <dgm:fillClrLst meth="repeat">
+      <a:schemeClr val="accent1">
+        <a:tint val="60000"/>
+      </a:schemeClr>
+    </dgm:fillClrLst>
+    <dgm:linClrLst meth="repeat">
+      <a:schemeClr val="accent1">
+        <a:tint val="60000"/>
+      </a:schemeClr>
+    </dgm:linClrLst>
+    <dgm:effectClrLst/>
+    <dgm:txLinClrLst/>
+    <dgm:txFillClrLst meth="repeat">
+      <a:schemeClr val="lt1"/>
+    </dgm:txFillClrLst>
+    <dgm:txEffectClrLst/>
+  </dgm:styleLbl>
+  <dgm:styleLbl name="parChTrans2D2">
+    <dgm:fillClrLst meth="repeat">
+      <a:schemeClr val="accent1"/>
+    </dgm:fillClrLst>
+    <dgm:linClrLst meth="repeat">
+      <a:schemeClr val="accent1"/>
+    </dgm:linClrLst>
+    <dgm:effectClrLst/>
+    <dgm:txLinClrLst/>
+    <dgm:txFillClrLst meth="repeat">
+      <a:schemeClr val="lt1"/>
+    </dgm:txFillClrLst>
+    <dgm:txEffectClrLst/>
+  </dgm:styleLbl>
+  <dgm:styleLbl name="parChTrans2D3">
+    <dgm:fillClrLst meth="repeat">
+      <a:schemeClr val="accent1"/>
+    </dgm:fillClrLst>
+    <dgm:linClrLst meth="repeat">
+      <a:schemeClr val="accent1"/>
+    </dgm:linClrLst>
+    <dgm:effectClrLst/>
+    <dgm:txLinClrLst/>
+    <dgm:txFillClrLst meth="repeat">
+      <a:schemeClr val="lt1"/>
+    </dgm:txFillClrLst>
+    <dgm:txEffectClrLst/>
+  </dgm:styleLbl>
+  <dgm:styleLbl name="parChTrans2D4">
+    <dgm:fillClrLst meth="repeat">
+      <a:schemeClr val="accent1"/>
+    </dgm:fillClrLst>
+    <dgm:linClrLst meth="repeat">
+      <a:schemeClr val="accent1"/>
+    </dgm:linClrLst>
+    <dgm:effectClrLst/>
+    <dgm:txLinClrLst/>
+    <dgm:txFillClrLst meth="repeat">
+      <a:schemeClr val="lt1"/>
+    </dgm:txFillClrLst>
+    <dgm:txEffectClrLst/>
+  </dgm:styleLbl>
+  <dgm:styleLbl name="parChTrans1D1">
+    <dgm:fillClrLst meth="repeat">
+      <a:schemeClr val="accent1"/>
+    </dgm:fillClrLst>
+    <dgm:linClrLst meth="repeat">
+      <a:schemeClr val="accent1">
+        <a:shade val="60000"/>
+      </a:schemeClr>
+    </dgm:linClrLst>
+    <dgm:effectClrLst/>
+    <dgm:txLinClrLst/>
+    <dgm:txFillClrLst meth="repeat">
+      <a:schemeClr val="tx1"/>
+    </dgm:txFillClrLst>
+    <dgm:txEffectClrLst/>
+  </dgm:styleLbl>
+  <dgm:styleLbl name="parChTrans1D2">
+    <dgm:fillClrLst meth="repeat">
+      <a:schemeClr val="accent1"/>
+    </dgm:fillClrLst>
+    <dgm:linClrLst meth="repeat">
+      <a:schemeClr val="accent1">
+        <a:shade val="60000"/>
+      </a:schemeClr>
+    </dgm:linClrLst>
+    <dgm:effectClrLst/>
+    <dgm:txLinClrLst/>
+    <dgm:txFillClrLst meth="repeat">
+      <a:schemeClr val="tx1"/>
+    </dgm:txFillClrLst>
+    <dgm:txEffectClrLst/>
+  </dgm:styleLbl>
+  <dgm:styleLbl name="parChTrans1D3">
+    <dgm:fillClrLst meth="repeat">
+      <a:schemeClr val="accent1"/>
+    </dgm:fillClrLst>
+    <dgm:linClrLst meth="repeat">
+      <a:schemeClr val="accent1">
+        <a:shade val="80000"/>
+      </a:schemeClr>
+    </dgm:linClrLst>
+    <dgm:effectClrLst/>
+    <dgm:txLinClrLst/>
+    <dgm:txFillClrLst meth="repeat">
+      <a:schemeClr val="tx1"/>
+    </dgm:txFillClrLst>
+    <dgm:txEffectClrLst/>
+  </dgm:styleLbl>
+  <dgm:styleLbl name="parChTrans1D4">
+    <dgm:fillClrLst meth="repeat">
+      <a:schemeClr val="accent1"/>
+    </dgm:fillClrLst>
+    <dgm:linClrLst meth="repeat">
+      <a:schemeClr val="accent1">
+        <a:shade val="80000"/>
+      </a:schemeClr>
+    </dgm:linClrLst>
+    <dgm:effectClrLst/>
+    <dgm:txLinClrLst/>
+    <dgm:txFillClrLst meth="repeat">
+      <a:schemeClr val="tx1"/>
+    </dgm:txFillClrLst>
+    <dgm:txEffectClrLst/>
+  </dgm:styleLbl>
+  <dgm:styleLbl name="fgAcc1">
+    <dgm:fillClrLst meth="repeat">
+      <a:schemeClr val="lt1">
+        <a:alpha val="90000"/>
+      </a:schemeClr>
+    </dgm:fillClrLst>
+    <dgm:linClrLst meth="repeat">
+      <a:schemeClr val="accent1"/>
+    </dgm:linClrLst>
+    <dgm:effectClrLst/>
+    <dgm:txLinClrLst/>
+    <dgm:txFillClrLst meth="repeat">
+      <a:schemeClr val="dk1"/>
+    </dgm:txFillClrLst>
+    <dgm:txEffectClrLst/>
+  </dgm:styleLbl>
+  <dgm:styleLbl name="conFgAcc1">
+    <dgm:fillClrLst meth="repeat">
+      <a:schemeClr val="lt1">
+        <a:alpha val="90000"/>
+      </a:schemeClr>
+    </dgm:fillClrLst>
+    <dgm:linClrLst meth="repeat">
+      <a:schemeClr val="accent1"/>
+    </dgm:linClrLst>
+    <dgm:effectClrLst/>
+    <dgm:txLinClrLst/>
+    <dgm:txFillClrLst meth="repeat">
+      <a:schemeClr val="dk1"/>
+    </dgm:txFillClrLst>
+    <dgm:txEffectClrLst/>
+  </dgm:styleLbl>
+  <dgm:styleLbl name="alignAcc1">
+    <dgm:fillClrLst meth="repeat">
+      <a:schemeClr val="lt1">
+        <a:alpha val="90000"/>
+      </a:schemeClr>
+    </dgm:fillClrLst>
+    <dgm:linClrLst meth="repeat">
+      <a:schemeClr val="accent1"/>
+    </dgm:linClrLst>
+    <dgm:effectClrLst/>
+    <dgm:txLinClrLst/>
+    <dgm:txFillClrLst meth="repeat">
+      <a:schemeClr val="dk1"/>
+    </dgm:txFillClrLst>
+    <dgm:txEffectClrLst/>
+  </dgm:styleLbl>
+  <dgm:styleLbl name="trAlignAcc1">
+    <dgm:fillClrLst meth="repeat">
+      <a:schemeClr val="lt1">
+        <a:alpha val="40000"/>
+      </a:schemeClr>
+    </dgm:fillClrLst>
+    <dgm:linClrLst meth="repeat">
+      <a:schemeClr val="accent1"/>
+    </dgm:linClrLst>
+    <dgm:effectClrLst/>
+    <dgm:txLinClrLst/>
+    <dgm:txFillClrLst meth="repeat">
+      <a:schemeClr val="dk1"/>
+    </dgm:txFillClrLst>
+    <dgm:txEffectClrLst/>
+  </dgm:styleLbl>
+  <dgm:styleLbl name="bgAcc1">
+    <dgm:fillClrLst meth="repeat">
+      <a:schemeClr val="lt1">
+        <a:alpha val="90000"/>
+      </a:schemeClr>
+    </dgm:fillClrLst>
+    <dgm:linClrLst meth="repeat">
+      <a:schemeClr val="accent1"/>
+    </dgm:linClrLst>
+    <dgm:effectClrLst/>
+    <dgm:txLinClrLst/>
+    <dgm:txFillClrLst meth="repeat">
+      <a:schemeClr val="dk1"/>
+    </dgm:txFillClrLst>
+    <dgm:txEffectClrLst/>
+  </dgm:styleLbl>
+  <dgm:styleLbl name="solidFgAcc1">
+    <dgm:fillClrLst meth="repeat">
+      <a:schemeClr val="lt1"/>
+    </dgm:fillClrLst>
+    <dgm:linClrLst meth="repeat">
+      <a:schemeClr val="accent1"/>
+    </dgm:linClrLst>
+    <dgm:effectClrLst/>
+    <dgm:txLinClrLst/>
+    <dgm:txFillClrLst meth="repeat">
+      <a:schemeClr val="dk1"/>
+    </dgm:txFillClrLst>
+    <dgm:txEffectClrLst/>
+  </dgm:styleLbl>
+  <dgm:styleLbl name="solidAlignAcc1">
+    <dgm:fillClrLst meth="repeat">
+      <a:schemeClr val="lt1"/>
+    </dgm:fillClrLst>
+    <dgm:linClrLst meth="repeat">
+      <a:schemeClr val="accent1"/>
+    </dgm:linClrLst>
+    <dgm:effectClrLst/>
+    <dgm:txLinClrLst/>
+    <dgm:txFillClrLst meth="repeat">
+      <a:schemeClr val="dk1"/>
+    </dgm:txFillClrLst>
+    <dgm:txEffectClrLst/>
+  </dgm:styleLbl>
+  <dgm:styleLbl name="solidBgAcc1">
+    <dgm:fillClrLst meth="repeat">
+      <a:schemeClr val="lt1"/>
+    </dgm:fillClrLst>
+    <dgm:linClrLst meth="repeat">
+      <a:schemeClr val="accent1"/>
+    </dgm:linClrLst>
+    <dgm:effectClrLst/>
+    <dgm:txLinClrLst/>
+    <dgm:txFillClrLst meth="repeat">
+      <a:schemeClr val="dk1"/>
+    </dgm:txFillClrLst>
+    <dgm:txEffectClrLst/>
+  </dgm:styleLbl>
+  <dgm:styleLbl name="fgAccFollowNode1">
+    <dgm:fillClrLst meth="repeat">
+      <a:schemeClr val="accent1">
+        <a:alpha val="90000"/>
+        <a:tint val="40000"/>
+      </a:schemeClr>
+    </dgm:fillClrLst>
+    <dgm:linClrLst meth="repeat">
+      <a:schemeClr val="accent1">
+        <a:alpha val="90000"/>
+        <a:tint val="40000"/>
+      </a:schemeClr>
+    </dgm:linClrLst>
+    <dgm:effectClrLst/>
+    <dgm:txLinClrLst/>
+    <dgm:txFillClrLst meth="repeat">
+      <a:schemeClr val="dk1"/>
+    </dgm:txFillClrLst>
+    <dgm:txEffectClrLst/>
+  </dgm:styleLbl>
+  <dgm:styleLbl name="alignAccFollowNode1">
+    <dgm:fillClrLst meth="repeat">
+      <a:schemeClr val="accent1">
+        <a:alpha val="90000"/>
+        <a:tint val="40000"/>
+      </a:schemeClr>
+    </dgm:fillClrLst>
+    <dgm:linClrLst meth="repeat">
+      <a:schemeClr val="accent1">
+        <a:alpha val="90000"/>
+        <a:tint val="40000"/>
+      </a:schemeClr>
+    </dgm:linClrLst>
+    <dgm:effectClrLst/>
+    <dgm:txLinClrLst/>
+    <dgm:txFillClrLst meth="repeat">
+      <a:schemeClr val="dk1"/>
+    </dgm:txFillClrLst>
+    <dgm:txEffectClrLst/>
+  </dgm:styleLbl>
+  <dgm:styleLbl name="bgAccFollowNode1">
+    <dgm:fillClrLst meth="repeat">
+      <a:schemeClr val="accent1">
+        <a:alpha val="90000"/>
+        <a:tint val="40000"/>
+      </a:schemeClr>
+    </dgm:fillClrLst>
+    <dgm:linClrLst meth="repeat">
+      <a:schemeClr val="accent1">
+        <a:alpha val="90000"/>
+        <a:tint val="40000"/>
+      </a:schemeClr>
+    </dgm:linClrLst>
+    <dgm:effectClrLst/>
+    <dgm:txLinClrLst/>
+    <dgm:txFillClrLst meth="repeat">
+      <a:schemeClr val="dk1"/>
+    </dgm:txFillClrLst>
+    <dgm:txEffectClrLst/>
+  </dgm:styleLbl>
+  <dgm:styleLbl name="fgAcc0">
+    <dgm:fillClrLst meth="repeat">
+      <a:schemeClr val="lt1">
+        <a:alpha val="90000"/>
+      </a:schemeClr>
+    </dgm:fillClrLst>
+    <dgm:linClrLst meth="repeat">
+      <a:schemeClr val="accent1"/>
+    </dgm:linClrLst>
+    <dgm:effectClrLst/>
+    <dgm:txLinClrLst/>
+    <dgm:txFillClrLst meth="repeat">
+      <a:schemeClr val="dk1"/>
+    </dgm:txFillClrLst>
+    <dgm:txEffectClrLst/>
+  </dgm:styleLbl>
+  <dgm:styleLbl name="fgAcc2">
+    <dgm:fillClrLst meth="repeat">
+      <a:schemeClr val="lt1">
+        <a:alpha val="90000"/>
+      </a:schemeClr>
+    </dgm:fillClrLst>
+    <dgm:linClrLst meth="repeat">
+      <a:schemeClr val="accent1"/>
+    </dgm:linClrLst>
+    <dgm:effectClrLst/>
+    <dgm:txLinClrLst/>
+    <dgm:txFillClrLst meth="repeat">
+      <a:schemeClr val="dk1"/>
+    </dgm:txFillClrLst>
+    <dgm:txEffectClrLst/>
+  </dgm:styleLbl>
+  <dgm:styleLbl name="fgAcc3">
+    <dgm:fillClrLst meth="repeat">
+      <a:schemeClr val="lt1">
+        <a:alpha val="90000"/>
+      </a:schemeClr>
+    </dgm:fillClrLst>
+    <dgm:linClrLst meth="repeat">
+      <a:schemeClr val="accent1"/>
+    </dgm:linClrLst>
+    <dgm:effectClrLst/>
+    <dgm:txLinClrLst/>
+    <dgm:txFillClrLst meth="repeat">
+      <a:schemeClr val="dk1"/>
+    </dgm:txFillClrLst>
+    <dgm:txEffectClrLst/>
+  </dgm:styleLbl>
+  <dgm:styleLbl name="fgAcc4">
+    <dgm:fillClrLst meth="repeat">
+      <a:schemeClr val="lt1">
+        <a:alpha val="90000"/>
+      </a:schemeClr>
+    </dgm:fillClrLst>
+    <dgm:linClrLst meth="repeat">
+      <a:schemeClr val="accent1"/>
+    </dgm:linClrLst>
+    <dgm:effectClrLst/>
+    <dgm:txLinClrLst/>
+    <dgm:txFillClrLst meth="repeat">
+      <a:schemeClr val="dk1"/>
+    </dgm:txFillClrLst>
+    <dgm:txEffectClrLst/>
+  </dgm:styleLbl>
+  <dgm:styleLbl name="bgShp">
+    <dgm:fillClrLst meth="repeat">
+      <a:schemeClr val="accent1">
+        <a:tint val="40000"/>
+      </a:schemeClr>
+    </dgm:fillClrLst>
+    <dgm:linClrLst meth="repeat">
+      <a:schemeClr val="accent1"/>
+    </dgm:linClrLst>
+    <dgm:effectClrLst/>
+    <dgm:txLinClrLst/>
+    <dgm:txFillClrLst meth="repeat">
+      <a:schemeClr val="dk1"/>
+    </dgm:txFillClrLst>
+    <dgm:txEffectClrLst/>
+  </dgm:styleLbl>
+  <dgm:styleLbl name="dkBgShp">
+    <dgm:fillClrLst meth="repeat">
+      <a:schemeClr val="accent1">
+        <a:shade val="80000"/>
+      </a:schemeClr>
+    </dgm:fillClrLst>
+    <dgm:linClrLst meth="repeat">
+      <a:schemeClr val="accent1"/>
+    </dgm:linClrLst>
+    <dgm:effectClrLst/>
+    <dgm:txLinClrLst/>
+    <dgm:txFillClrLst meth="repeat">
+      <a:schemeClr val="lt1"/>
+    </dgm:txFillClrLst>
+    <dgm:txEffectClrLst/>
+  </dgm:styleLbl>
+  <dgm:styleLbl name="trBgShp">
+    <dgm:fillClrLst meth="repeat">
+      <a:schemeClr val="accent1">
+        <a:tint val="50000"/>
+        <a:alpha val="40000"/>
+      </a:schemeClr>
+    </dgm:fillClrLst>
+    <dgm:linClrLst meth="repeat">
+      <a:schemeClr val="accent1"/>
+    </dgm:linClrLst>
+    <dgm:effectClrLst/>
+    <dgm:txLinClrLst/>
+    <dgm:txFillClrLst meth="repeat">
+      <a:schemeClr val="lt1"/>
+    </dgm:txFillClrLst>
+    <dgm:txEffectClrLst/>
+  </dgm:styleLbl>
+  <dgm:styleLbl name="fgShp">
+    <dgm:fillClrLst meth="repeat">
+      <a:schemeClr val="accent1">
+        <a:tint val="60000"/>
+      </a:schemeClr>
+    </dgm:fillClrLst>
+    <dgm:linClrLst meth="repeat">
+      <a:schemeClr val="lt1"/>
+    </dgm:linClrLst>
+    <dgm:effectClrLst/>
+    <dgm:txLinClrLst/>
+    <dgm:txFillClrLst meth="repeat">
+      <a:schemeClr val="dk1"/>
+    </dgm:txFillClrLst>
+    <dgm:txEffectClrLst/>
+  </dgm:styleLbl>
+  <dgm:styleLbl name="revTx">
+    <dgm:fillClrLst meth="repeat">
+      <a:schemeClr val="lt1">
+        <a:alpha val="0"/>
+      </a:schemeClr>
+    </dgm:fillClrLst>
+    <dgm:linClrLst meth="repeat">
+      <a:schemeClr val="dk1">
+        <a:alpha val="0"/>
+      </a:schemeClr>
+    </dgm:linClrLst>
+    <dgm:effectClrLst/>
+    <dgm:txLinClrLst/>
+    <dgm:txFillClrLst meth="repeat">
+      <a:schemeClr val="tx1"/>
+    </dgm:txFillClrLst>
+    <dgm:txEffectClrLst/>
+  </dgm:styleLbl>
+</dgm:colorsDef>
+</file>
+
+<file path=ppt/diagrams/colors3.xml><?xml version="1.0" encoding="utf-8"?>
 <dgm:colorsDef xmlns:dgm="http://schemas.openxmlformats.org/drawingml/2006/diagram" xmlns:a="http://schemas.openxmlformats.org/drawingml/2006/main" uniqueId="urn:microsoft.com/office/officeart/2005/8/colors/accent1_2">
   <dgm:title val=""/>
   <dgm:desc val=""/>
@@ -2274,6 +3022,458 @@
     <dgm:pt modelId="{E560796D-BB92-4093-82F8-34EEAADB899F}">
       <dgm:prSet phldrT="[Text]"/>
       <dgm:spPr/>
+      <dgm:t>
+        <a:bodyPr/>
+        <a:lstStyle/>
+        <a:p>
+          <a:r>
+            <a:rPr lang="de-DE" dirty="0" err="1"/>
+            <a:t>Align</a:t>
+          </a:r>
+          <a:r>
+            <a:rPr lang="de-DE" dirty="0"/>
+            <a:t> &amp; </a:t>
+          </a:r>
+          <a:r>
+            <a:rPr lang="de-DE" dirty="0" err="1"/>
+            <a:t>upload</a:t>
+          </a:r>
+          <a:r>
+            <a:rPr lang="de-DE" dirty="0"/>
+            <a:t> to database </a:t>
+          </a:r>
+          <a:endParaRPr lang="en-US" dirty="0"/>
+        </a:p>
+      </dgm:t>
+    </dgm:pt>
+    <dgm:pt modelId="{334396E8-E3C3-432B-8C3B-AB3306066237}" type="parTrans" cxnId="{12C86485-1D33-43E1-A32D-FB0807F3DD3A}">
+      <dgm:prSet/>
+      <dgm:spPr/>
+      <dgm:t>
+        <a:bodyPr/>
+        <a:lstStyle/>
+        <a:p>
+          <a:endParaRPr lang="en-US"/>
+        </a:p>
+      </dgm:t>
+    </dgm:pt>
+    <dgm:pt modelId="{543EA96B-3613-407C-88D3-682227FC4129}" type="sibTrans" cxnId="{12C86485-1D33-43E1-A32D-FB0807F3DD3A}">
+      <dgm:prSet/>
+      <dgm:spPr/>
+      <dgm:t>
+        <a:bodyPr/>
+        <a:lstStyle/>
+        <a:p>
+          <a:endParaRPr lang="en-US"/>
+        </a:p>
+      </dgm:t>
+    </dgm:pt>
+    <dgm:pt modelId="{9795B689-1BF9-4ED4-87EA-F62CBB5FCCC2}" type="pres">
+      <dgm:prSet presAssocID="{975A9F71-CC63-4E00-9FD8-ABAC2E573EC6}" presName="theList" presStyleCnt="0">
+        <dgm:presLayoutVars>
+          <dgm:dir/>
+          <dgm:animLvl val="lvl"/>
+          <dgm:resizeHandles val="exact"/>
+        </dgm:presLayoutVars>
+      </dgm:prSet>
+      <dgm:spPr/>
+    </dgm:pt>
+    <dgm:pt modelId="{C7E81B2A-12BC-43DF-A726-8E3804677E3F}" type="pres">
+      <dgm:prSet presAssocID="{7AED6D8C-3B2A-4640-A874-DB9076A45D63}" presName="compNode" presStyleCnt="0"/>
+      <dgm:spPr/>
+    </dgm:pt>
+    <dgm:pt modelId="{AACECBC5-6F21-4A2C-9C21-4E3E2A5FAECE}" type="pres">
+      <dgm:prSet presAssocID="{7AED6D8C-3B2A-4640-A874-DB9076A45D63}" presName="noGeometry" presStyleCnt="0"/>
+      <dgm:spPr/>
+    </dgm:pt>
+    <dgm:pt modelId="{E8486F00-15B0-4C3F-AC23-50654CB4F0A9}" type="pres">
+      <dgm:prSet presAssocID="{7AED6D8C-3B2A-4640-A874-DB9076A45D63}" presName="childTextVisible" presStyleLbl="bgAccFollowNode1" presStyleIdx="0" presStyleCnt="3">
+        <dgm:presLayoutVars>
+          <dgm:bulletEnabled val="1"/>
+        </dgm:presLayoutVars>
+      </dgm:prSet>
+      <dgm:spPr/>
+    </dgm:pt>
+    <dgm:pt modelId="{299FC30A-75A5-4F22-83FD-70A1F4059962}" type="pres">
+      <dgm:prSet presAssocID="{7AED6D8C-3B2A-4640-A874-DB9076A45D63}" presName="childTextHidden" presStyleLbl="bgAccFollowNode1" presStyleIdx="0" presStyleCnt="3"/>
+      <dgm:spPr/>
+    </dgm:pt>
+    <dgm:pt modelId="{88C48523-967B-4457-B2FB-73A995CCEFF6}" type="pres">
+      <dgm:prSet presAssocID="{7AED6D8C-3B2A-4640-A874-DB9076A45D63}" presName="parentText" presStyleLbl="node1" presStyleIdx="0" presStyleCnt="3">
+        <dgm:presLayoutVars>
+          <dgm:chMax val="1"/>
+          <dgm:bulletEnabled val="1"/>
+        </dgm:presLayoutVars>
+      </dgm:prSet>
+      <dgm:spPr/>
+    </dgm:pt>
+    <dgm:pt modelId="{F2CB3792-37EC-4C7C-8D70-8B0CE6DC42F9}" type="pres">
+      <dgm:prSet presAssocID="{7AED6D8C-3B2A-4640-A874-DB9076A45D63}" presName="aSpace" presStyleCnt="0"/>
+      <dgm:spPr/>
+    </dgm:pt>
+    <dgm:pt modelId="{3ED76016-1692-4194-A9D3-A35087E3D1EB}" type="pres">
+      <dgm:prSet presAssocID="{A5034A1A-E2DF-42C0-8B8F-AFFDC2D5187D}" presName="compNode" presStyleCnt="0"/>
+      <dgm:spPr/>
+    </dgm:pt>
+    <dgm:pt modelId="{F6F90DE4-9A11-4601-BD0C-4BD02734DF44}" type="pres">
+      <dgm:prSet presAssocID="{A5034A1A-E2DF-42C0-8B8F-AFFDC2D5187D}" presName="noGeometry" presStyleCnt="0"/>
+      <dgm:spPr/>
+    </dgm:pt>
+    <dgm:pt modelId="{DDB66F64-0DB7-4CC8-BFBD-952FC72551E1}" type="pres">
+      <dgm:prSet presAssocID="{A5034A1A-E2DF-42C0-8B8F-AFFDC2D5187D}" presName="childTextVisible" presStyleLbl="bgAccFollowNode1" presStyleIdx="1" presStyleCnt="3">
+        <dgm:presLayoutVars>
+          <dgm:bulletEnabled val="1"/>
+        </dgm:presLayoutVars>
+      </dgm:prSet>
+      <dgm:spPr/>
+    </dgm:pt>
+    <dgm:pt modelId="{1E200446-A447-4721-8334-08A9515E88E3}" type="pres">
+      <dgm:prSet presAssocID="{A5034A1A-E2DF-42C0-8B8F-AFFDC2D5187D}" presName="childTextHidden" presStyleLbl="bgAccFollowNode1" presStyleIdx="1" presStyleCnt="3"/>
+      <dgm:spPr/>
+    </dgm:pt>
+    <dgm:pt modelId="{1B7B54BA-848D-4230-B11F-536749F1A4AD}" type="pres">
+      <dgm:prSet presAssocID="{A5034A1A-E2DF-42C0-8B8F-AFFDC2D5187D}" presName="parentText" presStyleLbl="node1" presStyleIdx="1" presStyleCnt="3">
+        <dgm:presLayoutVars>
+          <dgm:chMax val="1"/>
+          <dgm:bulletEnabled val="1"/>
+        </dgm:presLayoutVars>
+      </dgm:prSet>
+      <dgm:spPr/>
+    </dgm:pt>
+    <dgm:pt modelId="{B80BB572-3D07-4CA4-B8B1-CC1F10416456}" type="pres">
+      <dgm:prSet presAssocID="{A5034A1A-E2DF-42C0-8B8F-AFFDC2D5187D}" presName="aSpace" presStyleCnt="0"/>
+      <dgm:spPr/>
+    </dgm:pt>
+    <dgm:pt modelId="{69FF921B-84B1-4885-97E3-BE37D04600CB}" type="pres">
+      <dgm:prSet presAssocID="{7AB01F6B-43F0-4458-9406-C594B17071E8}" presName="compNode" presStyleCnt="0"/>
+      <dgm:spPr/>
+    </dgm:pt>
+    <dgm:pt modelId="{656EEC59-776D-43E8-B423-F955FF75262A}" type="pres">
+      <dgm:prSet presAssocID="{7AB01F6B-43F0-4458-9406-C594B17071E8}" presName="noGeometry" presStyleCnt="0"/>
+      <dgm:spPr/>
+    </dgm:pt>
+    <dgm:pt modelId="{E02F1C73-8013-46DE-AC73-B1C23F41A819}" type="pres">
+      <dgm:prSet presAssocID="{7AB01F6B-43F0-4458-9406-C594B17071E8}" presName="childTextVisible" presStyleLbl="bgAccFollowNode1" presStyleIdx="2" presStyleCnt="3">
+        <dgm:presLayoutVars>
+          <dgm:bulletEnabled val="1"/>
+        </dgm:presLayoutVars>
+      </dgm:prSet>
+      <dgm:spPr/>
+    </dgm:pt>
+    <dgm:pt modelId="{D41D4969-9245-4127-BCCC-796D901152CC}" type="pres">
+      <dgm:prSet presAssocID="{7AB01F6B-43F0-4458-9406-C594B17071E8}" presName="childTextHidden" presStyleLbl="bgAccFollowNode1" presStyleIdx="2" presStyleCnt="3"/>
+      <dgm:spPr/>
+    </dgm:pt>
+    <dgm:pt modelId="{53CE94EB-C8C2-467C-9192-AFBE4344C7BB}" type="pres">
+      <dgm:prSet presAssocID="{7AB01F6B-43F0-4458-9406-C594B17071E8}" presName="parentText" presStyleLbl="node1" presStyleIdx="2" presStyleCnt="3">
+        <dgm:presLayoutVars>
+          <dgm:chMax val="1"/>
+          <dgm:bulletEnabled val="1"/>
+        </dgm:presLayoutVars>
+      </dgm:prSet>
+      <dgm:spPr/>
+    </dgm:pt>
+  </dgm:ptLst>
+  <dgm:cxnLst>
+    <dgm:cxn modelId="{4E0C6923-40C4-4638-ABAD-05259054D877}" type="presOf" srcId="{7AED6D8C-3B2A-4640-A874-DB9076A45D63}" destId="{88C48523-967B-4457-B2FB-73A995CCEFF6}" srcOrd="0" destOrd="0" presId="urn:microsoft.com/office/officeart/2005/8/layout/hProcess6"/>
+    <dgm:cxn modelId="{E139BB2B-1C7A-4CBF-9A60-44EDB05B9B68}" srcId="{975A9F71-CC63-4E00-9FD8-ABAC2E573EC6}" destId="{7AB01F6B-43F0-4458-9406-C594B17071E8}" srcOrd="2" destOrd="0" parTransId="{BB517721-AB85-4F5A-8612-39F16211F87C}" sibTransId="{13E16DB0-A1E3-4939-B4A4-4DE85891E4B4}"/>
+    <dgm:cxn modelId="{AC357639-FB35-49CB-9F17-FF92535CF9A2}" type="presOf" srcId="{975A9F71-CC63-4E00-9FD8-ABAC2E573EC6}" destId="{9795B689-1BF9-4ED4-87EA-F62CBB5FCCC2}" srcOrd="0" destOrd="0" presId="urn:microsoft.com/office/officeart/2005/8/layout/hProcess6"/>
+    <dgm:cxn modelId="{939EDB5D-B0BC-4F07-9958-DF71D6C3F0AA}" type="presOf" srcId="{E560796D-BB92-4093-82F8-34EEAADB899F}" destId="{E02F1C73-8013-46DE-AC73-B1C23F41A819}" srcOrd="0" destOrd="0" presId="urn:microsoft.com/office/officeart/2005/8/layout/hProcess6"/>
+    <dgm:cxn modelId="{91545A46-FC56-4539-9AB2-453480F90F4A}" type="presOf" srcId="{5A80AEC5-59DD-4E7A-807C-5F34699EDAAC}" destId="{DDB66F64-0DB7-4CC8-BFBD-952FC72551E1}" srcOrd="0" destOrd="0" presId="urn:microsoft.com/office/officeart/2005/8/layout/hProcess6"/>
+    <dgm:cxn modelId="{678AF268-46D9-40EC-A616-D83566CBFAA7}" srcId="{975A9F71-CC63-4E00-9FD8-ABAC2E573EC6}" destId="{7AED6D8C-3B2A-4640-A874-DB9076A45D63}" srcOrd="0" destOrd="0" parTransId="{F2C11852-3C0D-442A-9A08-AEDF4998E24F}" sibTransId="{53F1FB9C-61AE-4C93-BA35-6221E961A649}"/>
+    <dgm:cxn modelId="{B490737C-809A-44CF-A4F3-EA94350DAD5E}" type="presOf" srcId="{E560796D-BB92-4093-82F8-34EEAADB899F}" destId="{D41D4969-9245-4127-BCCC-796D901152CC}" srcOrd="1" destOrd="0" presId="urn:microsoft.com/office/officeart/2005/8/layout/hProcess6"/>
+    <dgm:cxn modelId="{12C86485-1D33-43E1-A32D-FB0807F3DD3A}" srcId="{7AB01F6B-43F0-4458-9406-C594B17071E8}" destId="{E560796D-BB92-4093-82F8-34EEAADB899F}" srcOrd="0" destOrd="0" parTransId="{334396E8-E3C3-432B-8C3B-AB3306066237}" sibTransId="{543EA96B-3613-407C-88D3-682227FC4129}"/>
+    <dgm:cxn modelId="{359C128D-7B91-48B6-96C1-69D12E6EC8EF}" type="presOf" srcId="{7AB01F6B-43F0-4458-9406-C594B17071E8}" destId="{53CE94EB-C8C2-467C-9192-AFBE4344C7BB}" srcOrd="0" destOrd="0" presId="urn:microsoft.com/office/officeart/2005/8/layout/hProcess6"/>
+    <dgm:cxn modelId="{1AB5AB91-9E5F-4EB6-B745-D47D44AD40E2}" type="presOf" srcId="{5CBD6172-E0FA-4112-90D6-155814BF9EB9}" destId="{E8486F00-15B0-4C3F-AC23-50654CB4F0A9}" srcOrd="0" destOrd="0" presId="urn:microsoft.com/office/officeart/2005/8/layout/hProcess6"/>
+    <dgm:cxn modelId="{A082B5AB-FC9F-4EF2-94CC-4E948BCE3B62}" type="presOf" srcId="{5A80AEC5-59DD-4E7A-807C-5F34699EDAAC}" destId="{1E200446-A447-4721-8334-08A9515E88E3}" srcOrd="1" destOrd="0" presId="urn:microsoft.com/office/officeart/2005/8/layout/hProcess6"/>
+    <dgm:cxn modelId="{1760BCC0-DB26-4C57-8664-C1508C230F89}" type="presOf" srcId="{A5034A1A-E2DF-42C0-8B8F-AFFDC2D5187D}" destId="{1B7B54BA-848D-4230-B11F-536749F1A4AD}" srcOrd="0" destOrd="0" presId="urn:microsoft.com/office/officeart/2005/8/layout/hProcess6"/>
+    <dgm:cxn modelId="{A373DACE-CBD3-4BAA-992A-E03C44B1F3F2}" srcId="{7AED6D8C-3B2A-4640-A874-DB9076A45D63}" destId="{5CBD6172-E0FA-4112-90D6-155814BF9EB9}" srcOrd="0" destOrd="0" parTransId="{793C6308-3443-4751-BA8D-C1B81B0F6CB3}" sibTransId="{6E713F62-234A-4AE4-88BC-F53AE3F84408}"/>
+    <dgm:cxn modelId="{2362DED4-0B2F-4B3E-8474-8D014E522BF8}" type="presOf" srcId="{5CBD6172-E0FA-4112-90D6-155814BF9EB9}" destId="{299FC30A-75A5-4F22-83FD-70A1F4059962}" srcOrd="1" destOrd="0" presId="urn:microsoft.com/office/officeart/2005/8/layout/hProcess6"/>
+    <dgm:cxn modelId="{698B9CDF-1121-4F55-AA28-831071B25A58}" srcId="{A5034A1A-E2DF-42C0-8B8F-AFFDC2D5187D}" destId="{5A80AEC5-59DD-4E7A-807C-5F34699EDAAC}" srcOrd="0" destOrd="0" parTransId="{309C59B6-3048-46B8-B9BA-5E9C07FD9807}" sibTransId="{E1B88B59-6D5A-4510-8FC9-591A307001BF}"/>
+    <dgm:cxn modelId="{E7A875F1-00C3-4544-A793-B80AFB51A843}" srcId="{975A9F71-CC63-4E00-9FD8-ABAC2E573EC6}" destId="{A5034A1A-E2DF-42C0-8B8F-AFFDC2D5187D}" srcOrd="1" destOrd="0" parTransId="{68FA442A-033D-4855-B5BF-55B2A6688FD5}" sibTransId="{78C9FB0D-2A9D-4575-8A86-B174E9000883}"/>
+    <dgm:cxn modelId="{E814956B-125F-4F5B-83A6-AC3982AC728E}" type="presParOf" srcId="{9795B689-1BF9-4ED4-87EA-F62CBB5FCCC2}" destId="{C7E81B2A-12BC-43DF-A726-8E3804677E3F}" srcOrd="0" destOrd="0" presId="urn:microsoft.com/office/officeart/2005/8/layout/hProcess6"/>
+    <dgm:cxn modelId="{8A7DA21A-2285-4A33-9B1E-7C5EACA5E8E8}" type="presParOf" srcId="{C7E81B2A-12BC-43DF-A726-8E3804677E3F}" destId="{AACECBC5-6F21-4A2C-9C21-4E3E2A5FAECE}" srcOrd="0" destOrd="0" presId="urn:microsoft.com/office/officeart/2005/8/layout/hProcess6"/>
+    <dgm:cxn modelId="{9C4D8F17-30A5-4D3E-96B5-A134A8947770}" type="presParOf" srcId="{C7E81B2A-12BC-43DF-A726-8E3804677E3F}" destId="{E8486F00-15B0-4C3F-AC23-50654CB4F0A9}" srcOrd="1" destOrd="0" presId="urn:microsoft.com/office/officeart/2005/8/layout/hProcess6"/>
+    <dgm:cxn modelId="{C0856C60-915D-40F7-822D-84B12DEFBC4D}" type="presParOf" srcId="{C7E81B2A-12BC-43DF-A726-8E3804677E3F}" destId="{299FC30A-75A5-4F22-83FD-70A1F4059962}" srcOrd="2" destOrd="0" presId="urn:microsoft.com/office/officeart/2005/8/layout/hProcess6"/>
+    <dgm:cxn modelId="{5F465669-D6B7-4E5D-A244-2535D3675A22}" type="presParOf" srcId="{C7E81B2A-12BC-43DF-A726-8E3804677E3F}" destId="{88C48523-967B-4457-B2FB-73A995CCEFF6}" srcOrd="3" destOrd="0" presId="urn:microsoft.com/office/officeart/2005/8/layout/hProcess6"/>
+    <dgm:cxn modelId="{4144E924-D9F8-468D-9D05-455BF65E7B20}" type="presParOf" srcId="{9795B689-1BF9-4ED4-87EA-F62CBB5FCCC2}" destId="{F2CB3792-37EC-4C7C-8D70-8B0CE6DC42F9}" srcOrd="1" destOrd="0" presId="urn:microsoft.com/office/officeart/2005/8/layout/hProcess6"/>
+    <dgm:cxn modelId="{92A3028C-9C6A-49BF-B1F4-EAC086F0BA1D}" type="presParOf" srcId="{9795B689-1BF9-4ED4-87EA-F62CBB5FCCC2}" destId="{3ED76016-1692-4194-A9D3-A35087E3D1EB}" srcOrd="2" destOrd="0" presId="urn:microsoft.com/office/officeart/2005/8/layout/hProcess6"/>
+    <dgm:cxn modelId="{0883E2AA-2332-48C8-A91D-A15F34DC32B5}" type="presParOf" srcId="{3ED76016-1692-4194-A9D3-A35087E3D1EB}" destId="{F6F90DE4-9A11-4601-BD0C-4BD02734DF44}" srcOrd="0" destOrd="0" presId="urn:microsoft.com/office/officeart/2005/8/layout/hProcess6"/>
+    <dgm:cxn modelId="{70A40ABB-DAB3-44C9-B743-B5EBB9AA0D08}" type="presParOf" srcId="{3ED76016-1692-4194-A9D3-A35087E3D1EB}" destId="{DDB66F64-0DB7-4CC8-BFBD-952FC72551E1}" srcOrd="1" destOrd="0" presId="urn:microsoft.com/office/officeart/2005/8/layout/hProcess6"/>
+    <dgm:cxn modelId="{67A9F40B-7A52-4255-A820-0BEA490D0BAA}" type="presParOf" srcId="{3ED76016-1692-4194-A9D3-A35087E3D1EB}" destId="{1E200446-A447-4721-8334-08A9515E88E3}" srcOrd="2" destOrd="0" presId="urn:microsoft.com/office/officeart/2005/8/layout/hProcess6"/>
+    <dgm:cxn modelId="{1C69DE41-7823-4448-BE6D-1472E7EC6040}" type="presParOf" srcId="{3ED76016-1692-4194-A9D3-A35087E3D1EB}" destId="{1B7B54BA-848D-4230-B11F-536749F1A4AD}" srcOrd="3" destOrd="0" presId="urn:microsoft.com/office/officeart/2005/8/layout/hProcess6"/>
+    <dgm:cxn modelId="{DE91879F-B7FC-4A36-8CC9-BC062A508945}" type="presParOf" srcId="{9795B689-1BF9-4ED4-87EA-F62CBB5FCCC2}" destId="{B80BB572-3D07-4CA4-B8B1-CC1F10416456}" srcOrd="3" destOrd="0" presId="urn:microsoft.com/office/officeart/2005/8/layout/hProcess6"/>
+    <dgm:cxn modelId="{4B64D859-38D6-4D19-A668-E657F659A7B8}" type="presParOf" srcId="{9795B689-1BF9-4ED4-87EA-F62CBB5FCCC2}" destId="{69FF921B-84B1-4885-97E3-BE37D04600CB}" srcOrd="4" destOrd="0" presId="urn:microsoft.com/office/officeart/2005/8/layout/hProcess6"/>
+    <dgm:cxn modelId="{E03B2067-5887-4E35-817F-97C2832DE92E}" type="presParOf" srcId="{69FF921B-84B1-4885-97E3-BE37D04600CB}" destId="{656EEC59-776D-43E8-B423-F955FF75262A}" srcOrd="0" destOrd="0" presId="urn:microsoft.com/office/officeart/2005/8/layout/hProcess6"/>
+    <dgm:cxn modelId="{989BC95E-5CF4-4C1C-A37A-0664BD0E1B1C}" type="presParOf" srcId="{69FF921B-84B1-4885-97E3-BE37D04600CB}" destId="{E02F1C73-8013-46DE-AC73-B1C23F41A819}" srcOrd="1" destOrd="0" presId="urn:microsoft.com/office/officeart/2005/8/layout/hProcess6"/>
+    <dgm:cxn modelId="{AA77E561-B7E3-4400-BDD2-BFAC82FBD391}" type="presParOf" srcId="{69FF921B-84B1-4885-97E3-BE37D04600CB}" destId="{D41D4969-9245-4127-BCCC-796D901152CC}" srcOrd="2" destOrd="0" presId="urn:microsoft.com/office/officeart/2005/8/layout/hProcess6"/>
+    <dgm:cxn modelId="{404BD7CC-D172-4624-A3D9-61B87324B494}" type="presParOf" srcId="{69FF921B-84B1-4885-97E3-BE37D04600CB}" destId="{53CE94EB-C8C2-467C-9192-AFBE4344C7BB}" srcOrd="3" destOrd="0" presId="urn:microsoft.com/office/officeart/2005/8/layout/hProcess6"/>
+  </dgm:cxnLst>
+  <dgm:bg/>
+  <dgm:whole/>
+  <dgm:extLst>
+    <a:ext uri="http://schemas.microsoft.com/office/drawing/2008/diagram">
+      <dsp:dataModelExt xmlns:dsp="http://schemas.microsoft.com/office/drawing/2008/diagram" relId="rId6" minVer="http://schemas.openxmlformats.org/drawingml/2006/diagram"/>
+    </a:ext>
+  </dgm:extLst>
+</dgm:dataModel>
+</file>
+
+<file path=ppt/diagrams/data3.xml><?xml version="1.0" encoding="utf-8"?>
+<dgm:dataModel xmlns:dgm="http://schemas.openxmlformats.org/drawingml/2006/diagram" xmlns:a="http://schemas.openxmlformats.org/drawingml/2006/main">
+  <dgm:ptLst>
+    <dgm:pt modelId="{975A9F71-CC63-4E00-9FD8-ABAC2E573EC6}" type="doc">
+      <dgm:prSet loTypeId="urn:microsoft.com/office/officeart/2005/8/layout/hProcess6" loCatId="process" qsTypeId="urn:microsoft.com/office/officeart/2005/8/quickstyle/simple1" qsCatId="simple" csTypeId="urn:microsoft.com/office/officeart/2005/8/colors/accent1_2" csCatId="accent1" phldr="1"/>
+      <dgm:spPr/>
+      <dgm:t>
+        <a:bodyPr/>
+        <a:lstStyle/>
+        <a:p>
+          <a:endParaRPr lang="en-US"/>
+        </a:p>
+      </dgm:t>
+    </dgm:pt>
+    <dgm:pt modelId="{7AED6D8C-3B2A-4640-A874-DB9076A45D63}">
+      <dgm:prSet phldrT="[Text]"/>
+      <dgm:spPr>
+        <a:solidFill>
+          <a:srgbClr val="92D050"/>
+        </a:solidFill>
+      </dgm:spPr>
+      <dgm:t>
+        <a:bodyPr/>
+        <a:lstStyle/>
+        <a:p>
+          <a:r>
+            <a:rPr lang="de-DE" dirty="0"/>
+            <a:t>Excel </a:t>
+          </a:r>
+          <a:r>
+            <a:rPr lang="de-DE" dirty="0" err="1"/>
+            <a:t>sheets</a:t>
+          </a:r>
+          <a:endParaRPr lang="en-US" dirty="0"/>
+        </a:p>
+      </dgm:t>
+    </dgm:pt>
+    <dgm:pt modelId="{F2C11852-3C0D-442A-9A08-AEDF4998E24F}" type="parTrans" cxnId="{678AF268-46D9-40EC-A616-D83566CBFAA7}">
+      <dgm:prSet/>
+      <dgm:spPr/>
+      <dgm:t>
+        <a:bodyPr/>
+        <a:lstStyle/>
+        <a:p>
+          <a:endParaRPr lang="en-US"/>
+        </a:p>
+      </dgm:t>
+    </dgm:pt>
+    <dgm:pt modelId="{53F1FB9C-61AE-4C93-BA35-6221E961A649}" type="sibTrans" cxnId="{678AF268-46D9-40EC-A616-D83566CBFAA7}">
+      <dgm:prSet/>
+      <dgm:spPr/>
+      <dgm:t>
+        <a:bodyPr/>
+        <a:lstStyle/>
+        <a:p>
+          <a:endParaRPr lang="en-US"/>
+        </a:p>
+      </dgm:t>
+    </dgm:pt>
+    <dgm:pt modelId="{5CBD6172-E0FA-4112-90D6-155814BF9EB9}">
+      <dgm:prSet phldrT="[Text]"/>
+      <dgm:spPr>
+        <a:solidFill>
+          <a:srgbClr val="E9F6DC">
+            <a:alpha val="90000"/>
+          </a:srgbClr>
+        </a:solidFill>
+      </dgm:spPr>
+      <dgm:t>
+        <a:bodyPr/>
+        <a:lstStyle/>
+        <a:p>
+          <a:r>
+            <a:rPr lang="de-DE" dirty="0"/>
+            <a:t>Collect &amp; clean data</a:t>
+          </a:r>
+          <a:endParaRPr lang="en-US" dirty="0"/>
+        </a:p>
+      </dgm:t>
+    </dgm:pt>
+    <dgm:pt modelId="{793C6308-3443-4751-BA8D-C1B81B0F6CB3}" type="parTrans" cxnId="{A373DACE-CBD3-4BAA-992A-E03C44B1F3F2}">
+      <dgm:prSet/>
+      <dgm:spPr/>
+      <dgm:t>
+        <a:bodyPr/>
+        <a:lstStyle/>
+        <a:p>
+          <a:endParaRPr lang="en-US"/>
+        </a:p>
+      </dgm:t>
+    </dgm:pt>
+    <dgm:pt modelId="{6E713F62-234A-4AE4-88BC-F53AE3F84408}" type="sibTrans" cxnId="{A373DACE-CBD3-4BAA-992A-E03C44B1F3F2}">
+      <dgm:prSet/>
+      <dgm:spPr/>
+      <dgm:t>
+        <a:bodyPr/>
+        <a:lstStyle/>
+        <a:p>
+          <a:endParaRPr lang="en-US"/>
+        </a:p>
+      </dgm:t>
+    </dgm:pt>
+    <dgm:pt modelId="{A5034A1A-E2DF-42C0-8B8F-AFFDC2D5187D}">
+      <dgm:prSet phldrT="[Text]"/>
+      <dgm:spPr>
+        <a:solidFill>
+          <a:srgbClr val="92D050"/>
+        </a:solidFill>
+      </dgm:spPr>
+      <dgm:t>
+        <a:bodyPr/>
+        <a:lstStyle/>
+        <a:p>
+          <a:r>
+            <a:rPr lang="de-DE" dirty="0"/>
+            <a:t>Raw, </a:t>
+          </a:r>
+          <a:r>
+            <a:rPr lang="de-DE" dirty="0" err="1"/>
+            <a:t>cleaned</a:t>
+          </a:r>
+          <a:r>
+            <a:rPr lang="de-DE" dirty="0"/>
+            <a:t> data</a:t>
+          </a:r>
+          <a:endParaRPr lang="en-US" dirty="0"/>
+        </a:p>
+      </dgm:t>
+    </dgm:pt>
+    <dgm:pt modelId="{68FA442A-033D-4855-B5BF-55B2A6688FD5}" type="parTrans" cxnId="{E7A875F1-00C3-4544-A793-B80AFB51A843}">
+      <dgm:prSet/>
+      <dgm:spPr/>
+      <dgm:t>
+        <a:bodyPr/>
+        <a:lstStyle/>
+        <a:p>
+          <a:endParaRPr lang="en-US"/>
+        </a:p>
+      </dgm:t>
+    </dgm:pt>
+    <dgm:pt modelId="{78C9FB0D-2A9D-4575-8A86-B174E9000883}" type="sibTrans" cxnId="{E7A875F1-00C3-4544-A793-B80AFB51A843}">
+      <dgm:prSet/>
+      <dgm:spPr/>
+      <dgm:t>
+        <a:bodyPr/>
+        <a:lstStyle/>
+        <a:p>
+          <a:endParaRPr lang="en-US"/>
+        </a:p>
+      </dgm:t>
+    </dgm:pt>
+    <dgm:pt modelId="{5A80AEC5-59DD-4E7A-807C-5F34699EDAAC}">
+      <dgm:prSet phldrT="[Text]"/>
+      <dgm:spPr>
+        <a:solidFill>
+          <a:srgbClr val="FFFFCC">
+            <a:alpha val="90000"/>
+          </a:srgbClr>
+        </a:solidFill>
+      </dgm:spPr>
+      <dgm:t>
+        <a:bodyPr/>
+        <a:lstStyle/>
+        <a:p>
+          <a:r>
+            <a:rPr lang="de-DE" dirty="0"/>
+            <a:t>Aggregate </a:t>
+          </a:r>
+          <a:r>
+            <a:rPr lang="de-DE" dirty="0" err="1"/>
+            <a:t>information</a:t>
+          </a:r>
+          <a:endParaRPr lang="en-US" dirty="0"/>
+        </a:p>
+      </dgm:t>
+    </dgm:pt>
+    <dgm:pt modelId="{309C59B6-3048-46B8-B9BA-5E9C07FD9807}" type="parTrans" cxnId="{698B9CDF-1121-4F55-AA28-831071B25A58}">
+      <dgm:prSet/>
+      <dgm:spPr/>
+      <dgm:t>
+        <a:bodyPr/>
+        <a:lstStyle/>
+        <a:p>
+          <a:endParaRPr lang="en-US"/>
+        </a:p>
+      </dgm:t>
+    </dgm:pt>
+    <dgm:pt modelId="{E1B88B59-6D5A-4510-8FC9-591A307001BF}" type="sibTrans" cxnId="{698B9CDF-1121-4F55-AA28-831071B25A58}">
+      <dgm:prSet/>
+      <dgm:spPr/>
+      <dgm:t>
+        <a:bodyPr/>
+        <a:lstStyle/>
+        <a:p>
+          <a:endParaRPr lang="en-US"/>
+        </a:p>
+      </dgm:t>
+    </dgm:pt>
+    <dgm:pt modelId="{7AB01F6B-43F0-4458-9406-C594B17071E8}">
+      <dgm:prSet phldrT="[Text]"/>
+      <dgm:spPr>
+        <a:solidFill>
+          <a:schemeClr val="accent1">
+            <a:lumMod val="40000"/>
+            <a:lumOff val="60000"/>
+          </a:schemeClr>
+        </a:solidFill>
+      </dgm:spPr>
+      <dgm:t>
+        <a:bodyPr/>
+        <a:lstStyle/>
+        <a:p>
+          <a:r>
+            <a:rPr lang="de-DE" dirty="0" err="1"/>
+            <a:t>Processed</a:t>
+          </a:r>
+          <a:r>
+            <a:rPr lang="de-DE" dirty="0"/>
+            <a:t> data</a:t>
+          </a:r>
+          <a:endParaRPr lang="en-US" dirty="0"/>
+        </a:p>
+      </dgm:t>
+    </dgm:pt>
+    <dgm:pt modelId="{BB517721-AB85-4F5A-8612-39F16211F87C}" type="parTrans" cxnId="{E139BB2B-1C7A-4CBF-9A60-44EDB05B9B68}">
+      <dgm:prSet/>
+      <dgm:spPr/>
+      <dgm:t>
+        <a:bodyPr/>
+        <a:lstStyle/>
+        <a:p>
+          <a:endParaRPr lang="en-US"/>
+        </a:p>
+      </dgm:t>
+    </dgm:pt>
+    <dgm:pt modelId="{13E16DB0-A1E3-4939-B4A4-4DE85891E4B4}" type="sibTrans" cxnId="{E139BB2B-1C7A-4CBF-9A60-44EDB05B9B68}">
+      <dgm:prSet/>
+      <dgm:spPr/>
+      <dgm:t>
+        <a:bodyPr/>
+        <a:lstStyle/>
+        <a:p>
+          <a:endParaRPr lang="en-US"/>
+        </a:p>
+      </dgm:t>
+    </dgm:pt>
+    <dgm:pt modelId="{E560796D-BB92-4093-82F8-34EEAADB899F}">
+      <dgm:prSet phldrT="[Text]"/>
+      <dgm:spPr>
+        <a:solidFill>
+          <a:srgbClr val="FFFFCC">
+            <a:alpha val="90000"/>
+          </a:srgbClr>
+        </a:solidFill>
+      </dgm:spPr>
       <dgm:t>
         <a:bodyPr/>
         <a:lstStyle/>
@@ -3442,6 +4642,512 @@
 </dsp:drawing>
 </file>
 
+<file path=ppt/diagrams/drawing3.xml><?xml version="1.0" encoding="utf-8"?>
+<dsp:drawing xmlns:dgm="http://schemas.openxmlformats.org/drawingml/2006/diagram" xmlns:dsp="http://schemas.microsoft.com/office/drawing/2008/diagram" xmlns:a="http://schemas.openxmlformats.org/drawingml/2006/main">
+  <dsp:spTree>
+    <dsp:nvGrpSpPr>
+      <dsp:cNvPr id="0" name=""/>
+      <dsp:cNvGrpSpPr/>
+    </dsp:nvGrpSpPr>
+    <dsp:grpSpPr/>
+    <dsp:sp modelId="{E8486F00-15B0-4C3F-AC23-50654CB4F0A9}">
+      <dsp:nvSpPr>
+        <dsp:cNvPr id="0" name=""/>
+        <dsp:cNvSpPr/>
+      </dsp:nvSpPr>
+      <dsp:spPr>
+        <a:xfrm>
+          <a:off x="527843" y="1793468"/>
+          <a:ext cx="2095500" cy="1831730"/>
+        </a:xfrm>
+        <a:prstGeom prst="rightArrow">
+          <a:avLst>
+            <a:gd name="adj1" fmla="val 70000"/>
+            <a:gd name="adj2" fmla="val 50000"/>
+          </a:avLst>
+        </a:prstGeom>
+        <a:solidFill>
+          <a:srgbClr val="E9F6DC">
+            <a:alpha val="90000"/>
+          </a:srgbClr>
+        </a:solidFill>
+        <a:ln w="12700" cap="flat" cmpd="sng" algn="ctr">
+          <a:solidFill>
+            <a:schemeClr val="accent1">
+              <a:alpha val="90000"/>
+              <a:tint val="40000"/>
+              <a:hueOff val="0"/>
+              <a:satOff val="0"/>
+              <a:lumOff val="0"/>
+              <a:alphaOff val="0"/>
+            </a:schemeClr>
+          </a:solidFill>
+          <a:prstDash val="solid"/>
+          <a:miter lim="800000"/>
+        </a:ln>
+        <a:effectLst/>
+      </dsp:spPr>
+      <dsp:style>
+        <a:lnRef idx="2">
+          <a:scrgbClr r="0" g="0" b="0"/>
+        </a:lnRef>
+        <a:fillRef idx="1">
+          <a:scrgbClr r="0" g="0" b="0"/>
+        </a:fillRef>
+        <a:effectRef idx="0">
+          <a:scrgbClr r="0" g="0" b="0"/>
+        </a:effectRef>
+        <a:fontRef idx="minor"/>
+      </dsp:style>
+      <dsp:txBody>
+        <a:bodyPr spcFirstLastPara="0" vert="horz" wrap="square" lIns="38100" tIns="9525" rIns="19050" bIns="9525" numCol="1" spcCol="1270" anchor="ctr" anchorCtr="0">
+          <a:noAutofit/>
+        </a:bodyPr>
+        <a:lstStyle/>
+        <a:p>
+          <a:pPr marL="0" lvl="0" indent="0" algn="ctr" defTabSz="666750">
+            <a:lnSpc>
+              <a:spcPct val="90000"/>
+            </a:lnSpc>
+            <a:spcBef>
+              <a:spcPct val="0"/>
+            </a:spcBef>
+            <a:spcAft>
+              <a:spcPct val="35000"/>
+            </a:spcAft>
+            <a:buNone/>
+          </a:pPr>
+          <a:r>
+            <a:rPr lang="de-DE" sz="1500" kern="1200" dirty="0"/>
+            <a:t>Collect &amp; clean data</a:t>
+          </a:r>
+          <a:endParaRPr lang="en-US" sz="1500" kern="1200" dirty="0"/>
+        </a:p>
+      </dsp:txBody>
+      <dsp:txXfrm>
+        <a:off x="1051718" y="2068228"/>
+        <a:ext cx="1021556" cy="1282211"/>
+      </dsp:txXfrm>
+    </dsp:sp>
+    <dsp:sp modelId="{88C48523-967B-4457-B2FB-73A995CCEFF6}">
+      <dsp:nvSpPr>
+        <dsp:cNvPr id="0" name=""/>
+        <dsp:cNvSpPr/>
+      </dsp:nvSpPr>
+      <dsp:spPr>
+        <a:xfrm>
+          <a:off x="3968" y="2185458"/>
+          <a:ext cx="1047750" cy="1047750"/>
+        </a:xfrm>
+        <a:prstGeom prst="ellipse">
+          <a:avLst/>
+        </a:prstGeom>
+        <a:solidFill>
+          <a:srgbClr val="92D050"/>
+        </a:solidFill>
+        <a:ln w="12700" cap="flat" cmpd="sng" algn="ctr">
+          <a:solidFill>
+            <a:schemeClr val="lt1">
+              <a:hueOff val="0"/>
+              <a:satOff val="0"/>
+              <a:lumOff val="0"/>
+              <a:alphaOff val="0"/>
+            </a:schemeClr>
+          </a:solidFill>
+          <a:prstDash val="solid"/>
+          <a:miter lim="800000"/>
+        </a:ln>
+        <a:effectLst/>
+      </dsp:spPr>
+      <dsp:style>
+        <a:lnRef idx="2">
+          <a:scrgbClr r="0" g="0" b="0"/>
+        </a:lnRef>
+        <a:fillRef idx="1">
+          <a:scrgbClr r="0" g="0" b="0"/>
+        </a:fillRef>
+        <a:effectRef idx="0">
+          <a:scrgbClr r="0" g="0" b="0"/>
+        </a:effectRef>
+        <a:fontRef idx="minor">
+          <a:schemeClr val="lt1"/>
+        </a:fontRef>
+      </dsp:style>
+      <dsp:txBody>
+        <a:bodyPr spcFirstLastPara="0" vert="horz" wrap="square" lIns="8255" tIns="8255" rIns="8255" bIns="8255" numCol="1" spcCol="1270" anchor="ctr" anchorCtr="0">
+          <a:noAutofit/>
+        </a:bodyPr>
+        <a:lstStyle/>
+        <a:p>
+          <a:pPr marL="0" lvl="0" indent="0" algn="ctr" defTabSz="577850">
+            <a:lnSpc>
+              <a:spcPct val="90000"/>
+            </a:lnSpc>
+            <a:spcBef>
+              <a:spcPct val="0"/>
+            </a:spcBef>
+            <a:spcAft>
+              <a:spcPct val="35000"/>
+            </a:spcAft>
+            <a:buNone/>
+          </a:pPr>
+          <a:r>
+            <a:rPr lang="de-DE" sz="1300" kern="1200" dirty="0"/>
+            <a:t>Excel </a:t>
+          </a:r>
+          <a:r>
+            <a:rPr lang="de-DE" sz="1300" kern="1200" dirty="0" err="1"/>
+            <a:t>sheets</a:t>
+          </a:r>
+          <a:endParaRPr lang="en-US" sz="1300" kern="1200" dirty="0"/>
+        </a:p>
+      </dsp:txBody>
+      <dsp:txXfrm>
+        <a:off x="157407" y="2338897"/>
+        <a:ext cx="740872" cy="740872"/>
+      </dsp:txXfrm>
+    </dsp:sp>
+    <dsp:sp modelId="{DDB66F64-0DB7-4CC8-BFBD-952FC72551E1}">
+      <dsp:nvSpPr>
+        <dsp:cNvPr id="0" name=""/>
+        <dsp:cNvSpPr/>
+      </dsp:nvSpPr>
+      <dsp:spPr>
+        <a:xfrm>
+          <a:off x="3278187" y="1793468"/>
+          <a:ext cx="2095500" cy="1831730"/>
+        </a:xfrm>
+        <a:prstGeom prst="rightArrow">
+          <a:avLst>
+            <a:gd name="adj1" fmla="val 70000"/>
+            <a:gd name="adj2" fmla="val 50000"/>
+          </a:avLst>
+        </a:prstGeom>
+        <a:solidFill>
+          <a:srgbClr val="FFFFCC">
+            <a:alpha val="90000"/>
+          </a:srgbClr>
+        </a:solidFill>
+        <a:ln w="12700" cap="flat" cmpd="sng" algn="ctr">
+          <a:solidFill>
+            <a:schemeClr val="accent1">
+              <a:alpha val="90000"/>
+              <a:tint val="40000"/>
+              <a:hueOff val="0"/>
+              <a:satOff val="0"/>
+              <a:lumOff val="0"/>
+              <a:alphaOff val="0"/>
+            </a:schemeClr>
+          </a:solidFill>
+          <a:prstDash val="solid"/>
+          <a:miter lim="800000"/>
+        </a:ln>
+        <a:effectLst/>
+      </dsp:spPr>
+      <dsp:style>
+        <a:lnRef idx="2">
+          <a:scrgbClr r="0" g="0" b="0"/>
+        </a:lnRef>
+        <a:fillRef idx="1">
+          <a:scrgbClr r="0" g="0" b="0"/>
+        </a:fillRef>
+        <a:effectRef idx="0">
+          <a:scrgbClr r="0" g="0" b="0"/>
+        </a:effectRef>
+        <a:fontRef idx="minor"/>
+      </dsp:style>
+      <dsp:txBody>
+        <a:bodyPr spcFirstLastPara="0" vert="horz" wrap="square" lIns="38100" tIns="9525" rIns="19050" bIns="9525" numCol="1" spcCol="1270" anchor="ctr" anchorCtr="0">
+          <a:noAutofit/>
+        </a:bodyPr>
+        <a:lstStyle/>
+        <a:p>
+          <a:pPr marL="0" lvl="0" indent="0" algn="ctr" defTabSz="666750">
+            <a:lnSpc>
+              <a:spcPct val="90000"/>
+            </a:lnSpc>
+            <a:spcBef>
+              <a:spcPct val="0"/>
+            </a:spcBef>
+            <a:spcAft>
+              <a:spcPct val="35000"/>
+            </a:spcAft>
+            <a:buNone/>
+          </a:pPr>
+          <a:r>
+            <a:rPr lang="de-DE" sz="1500" kern="1200" dirty="0"/>
+            <a:t>Aggregate </a:t>
+          </a:r>
+          <a:r>
+            <a:rPr lang="de-DE" sz="1500" kern="1200" dirty="0" err="1"/>
+            <a:t>information</a:t>
+          </a:r>
+          <a:endParaRPr lang="en-US" sz="1500" kern="1200" dirty="0"/>
+        </a:p>
+      </dsp:txBody>
+      <dsp:txXfrm>
+        <a:off x="3802062" y="2068228"/>
+        <a:ext cx="1021556" cy="1282211"/>
+      </dsp:txXfrm>
+    </dsp:sp>
+    <dsp:sp modelId="{1B7B54BA-848D-4230-B11F-536749F1A4AD}">
+      <dsp:nvSpPr>
+        <dsp:cNvPr id="0" name=""/>
+        <dsp:cNvSpPr/>
+      </dsp:nvSpPr>
+      <dsp:spPr>
+        <a:xfrm>
+          <a:off x="2754312" y="2185458"/>
+          <a:ext cx="1047750" cy="1047750"/>
+        </a:xfrm>
+        <a:prstGeom prst="ellipse">
+          <a:avLst/>
+        </a:prstGeom>
+        <a:solidFill>
+          <a:srgbClr val="92D050"/>
+        </a:solidFill>
+        <a:ln w="12700" cap="flat" cmpd="sng" algn="ctr">
+          <a:solidFill>
+            <a:schemeClr val="lt1">
+              <a:hueOff val="0"/>
+              <a:satOff val="0"/>
+              <a:lumOff val="0"/>
+              <a:alphaOff val="0"/>
+            </a:schemeClr>
+          </a:solidFill>
+          <a:prstDash val="solid"/>
+          <a:miter lim="800000"/>
+        </a:ln>
+        <a:effectLst/>
+      </dsp:spPr>
+      <dsp:style>
+        <a:lnRef idx="2">
+          <a:scrgbClr r="0" g="0" b="0"/>
+        </a:lnRef>
+        <a:fillRef idx="1">
+          <a:scrgbClr r="0" g="0" b="0"/>
+        </a:fillRef>
+        <a:effectRef idx="0">
+          <a:scrgbClr r="0" g="0" b="0"/>
+        </a:effectRef>
+        <a:fontRef idx="minor">
+          <a:schemeClr val="lt1"/>
+        </a:fontRef>
+      </dsp:style>
+      <dsp:txBody>
+        <a:bodyPr spcFirstLastPara="0" vert="horz" wrap="square" lIns="8255" tIns="8255" rIns="8255" bIns="8255" numCol="1" spcCol="1270" anchor="ctr" anchorCtr="0">
+          <a:noAutofit/>
+        </a:bodyPr>
+        <a:lstStyle/>
+        <a:p>
+          <a:pPr marL="0" lvl="0" indent="0" algn="ctr" defTabSz="577850">
+            <a:lnSpc>
+              <a:spcPct val="90000"/>
+            </a:lnSpc>
+            <a:spcBef>
+              <a:spcPct val="0"/>
+            </a:spcBef>
+            <a:spcAft>
+              <a:spcPct val="35000"/>
+            </a:spcAft>
+            <a:buNone/>
+          </a:pPr>
+          <a:r>
+            <a:rPr lang="de-DE" sz="1300" kern="1200" dirty="0"/>
+            <a:t>Raw, </a:t>
+          </a:r>
+          <a:r>
+            <a:rPr lang="de-DE" sz="1300" kern="1200" dirty="0" err="1"/>
+            <a:t>cleaned</a:t>
+          </a:r>
+          <a:r>
+            <a:rPr lang="de-DE" sz="1300" kern="1200" dirty="0"/>
+            <a:t> data</a:t>
+          </a:r>
+          <a:endParaRPr lang="en-US" sz="1300" kern="1200" dirty="0"/>
+        </a:p>
+      </dsp:txBody>
+      <dsp:txXfrm>
+        <a:off x="2907751" y="2338897"/>
+        <a:ext cx="740872" cy="740872"/>
+      </dsp:txXfrm>
+    </dsp:sp>
+    <dsp:sp modelId="{E02F1C73-8013-46DE-AC73-B1C23F41A819}">
+      <dsp:nvSpPr>
+        <dsp:cNvPr id="0" name=""/>
+        <dsp:cNvSpPr/>
+      </dsp:nvSpPr>
+      <dsp:spPr>
+        <a:xfrm>
+          <a:off x="6028531" y="1793468"/>
+          <a:ext cx="2095500" cy="1831730"/>
+        </a:xfrm>
+        <a:prstGeom prst="rightArrow">
+          <a:avLst>
+            <a:gd name="adj1" fmla="val 70000"/>
+            <a:gd name="adj2" fmla="val 50000"/>
+          </a:avLst>
+        </a:prstGeom>
+        <a:solidFill>
+          <a:srgbClr val="FFFFCC">
+            <a:alpha val="90000"/>
+          </a:srgbClr>
+        </a:solidFill>
+        <a:ln w="12700" cap="flat" cmpd="sng" algn="ctr">
+          <a:solidFill>
+            <a:schemeClr val="accent1">
+              <a:alpha val="90000"/>
+              <a:tint val="40000"/>
+              <a:hueOff val="0"/>
+              <a:satOff val="0"/>
+              <a:lumOff val="0"/>
+              <a:alphaOff val="0"/>
+            </a:schemeClr>
+          </a:solidFill>
+          <a:prstDash val="solid"/>
+          <a:miter lim="800000"/>
+        </a:ln>
+        <a:effectLst/>
+      </dsp:spPr>
+      <dsp:style>
+        <a:lnRef idx="2">
+          <a:scrgbClr r="0" g="0" b="0"/>
+        </a:lnRef>
+        <a:fillRef idx="1">
+          <a:scrgbClr r="0" g="0" b="0"/>
+        </a:fillRef>
+        <a:effectRef idx="0">
+          <a:scrgbClr r="0" g="0" b="0"/>
+        </a:effectRef>
+        <a:fontRef idx="minor"/>
+      </dsp:style>
+      <dsp:txBody>
+        <a:bodyPr spcFirstLastPara="0" vert="horz" wrap="square" lIns="38100" tIns="9525" rIns="19050" bIns="9525" numCol="1" spcCol="1270" anchor="ctr" anchorCtr="0">
+          <a:noAutofit/>
+        </a:bodyPr>
+        <a:lstStyle/>
+        <a:p>
+          <a:pPr marL="0" lvl="0" indent="0" algn="ctr" defTabSz="666750">
+            <a:lnSpc>
+              <a:spcPct val="90000"/>
+            </a:lnSpc>
+            <a:spcBef>
+              <a:spcPct val="0"/>
+            </a:spcBef>
+            <a:spcAft>
+              <a:spcPct val="35000"/>
+            </a:spcAft>
+            <a:buNone/>
+          </a:pPr>
+          <a:r>
+            <a:rPr lang="de-DE" sz="1500" kern="1200" dirty="0" err="1"/>
+            <a:t>Align</a:t>
+          </a:r>
+          <a:r>
+            <a:rPr lang="de-DE" sz="1500" kern="1200" dirty="0"/>
+            <a:t> &amp; </a:t>
+          </a:r>
+          <a:r>
+            <a:rPr lang="de-DE" sz="1500" kern="1200" dirty="0" err="1"/>
+            <a:t>upload</a:t>
+          </a:r>
+          <a:r>
+            <a:rPr lang="de-DE" sz="1500" kern="1200" dirty="0"/>
+            <a:t> to database </a:t>
+          </a:r>
+          <a:endParaRPr lang="en-US" sz="1500" kern="1200" dirty="0"/>
+        </a:p>
+      </dsp:txBody>
+      <dsp:txXfrm>
+        <a:off x="6552406" y="2068228"/>
+        <a:ext cx="1021556" cy="1282211"/>
+      </dsp:txXfrm>
+    </dsp:sp>
+    <dsp:sp modelId="{53CE94EB-C8C2-467C-9192-AFBE4344C7BB}">
+      <dsp:nvSpPr>
+        <dsp:cNvPr id="0" name=""/>
+        <dsp:cNvSpPr/>
+      </dsp:nvSpPr>
+      <dsp:spPr>
+        <a:xfrm>
+          <a:off x="5504656" y="2185458"/>
+          <a:ext cx="1047750" cy="1047750"/>
+        </a:xfrm>
+        <a:prstGeom prst="ellipse">
+          <a:avLst/>
+        </a:prstGeom>
+        <a:solidFill>
+          <a:schemeClr val="accent1">
+            <a:lumMod val="40000"/>
+            <a:lumOff val="60000"/>
+          </a:schemeClr>
+        </a:solidFill>
+        <a:ln w="12700" cap="flat" cmpd="sng" algn="ctr">
+          <a:solidFill>
+            <a:schemeClr val="lt1">
+              <a:hueOff val="0"/>
+              <a:satOff val="0"/>
+              <a:lumOff val="0"/>
+              <a:alphaOff val="0"/>
+            </a:schemeClr>
+          </a:solidFill>
+          <a:prstDash val="solid"/>
+          <a:miter lim="800000"/>
+        </a:ln>
+        <a:effectLst/>
+      </dsp:spPr>
+      <dsp:style>
+        <a:lnRef idx="2">
+          <a:scrgbClr r="0" g="0" b="0"/>
+        </a:lnRef>
+        <a:fillRef idx="1">
+          <a:scrgbClr r="0" g="0" b="0"/>
+        </a:fillRef>
+        <a:effectRef idx="0">
+          <a:scrgbClr r="0" g="0" b="0"/>
+        </a:effectRef>
+        <a:fontRef idx="minor">
+          <a:schemeClr val="lt1"/>
+        </a:fontRef>
+      </dsp:style>
+      <dsp:txBody>
+        <a:bodyPr spcFirstLastPara="0" vert="horz" wrap="square" lIns="8255" tIns="8255" rIns="8255" bIns="8255" numCol="1" spcCol="1270" anchor="ctr" anchorCtr="0">
+          <a:noAutofit/>
+        </a:bodyPr>
+        <a:lstStyle/>
+        <a:p>
+          <a:pPr marL="0" lvl="0" indent="0" algn="ctr" defTabSz="577850">
+            <a:lnSpc>
+              <a:spcPct val="90000"/>
+            </a:lnSpc>
+            <a:spcBef>
+              <a:spcPct val="0"/>
+            </a:spcBef>
+            <a:spcAft>
+              <a:spcPct val="35000"/>
+            </a:spcAft>
+            <a:buNone/>
+          </a:pPr>
+          <a:r>
+            <a:rPr lang="de-DE" sz="1300" kern="1200" dirty="0" err="1"/>
+            <a:t>Processed</a:t>
+          </a:r>
+          <a:r>
+            <a:rPr lang="de-DE" sz="1300" kern="1200" dirty="0"/>
+            <a:t> data</a:t>
+          </a:r>
+          <a:endParaRPr lang="en-US" sz="1300" kern="1200" dirty="0"/>
+        </a:p>
+      </dsp:txBody>
+      <dsp:txXfrm>
+        <a:off x="5658095" y="2338897"/>
+        <a:ext cx="740872" cy="740872"/>
+      </dsp:txXfrm>
+    </dsp:sp>
+  </dsp:spTree>
+</dsp:drawing>
+</file>
+
 <file path=ppt/diagrams/layout1.xml><?xml version="1.0" encoding="utf-8"?>
 <dgm:layoutDef xmlns:dgm="http://schemas.openxmlformats.org/drawingml/2006/diagram" xmlns:a="http://schemas.openxmlformats.org/drawingml/2006/main" uniqueId="urn:microsoft.com/office/officeart/2005/8/layout/list1">
   <dgm:title val=""/>
@@ -3961,6 +5667,300 @@
 </dgm:layoutDef>
 </file>
 
+<file path=ppt/diagrams/layout3.xml><?xml version="1.0" encoding="utf-8"?>
+<dgm:layoutDef xmlns:dgm="http://schemas.openxmlformats.org/drawingml/2006/diagram" xmlns:a="http://schemas.openxmlformats.org/drawingml/2006/main" uniqueId="urn:microsoft.com/office/officeart/2005/8/layout/hProcess6">
+  <dgm:title val=""/>
+  <dgm:desc val=""/>
+  <dgm:catLst>
+    <dgm:cat type="process" pri="7000"/>
+  </dgm:catLst>
+  <dgm:sampData>
+    <dgm:dataModel>
+      <dgm:ptLst>
+        <dgm:pt modelId="0" type="doc"/>
+        <dgm:pt modelId="1">
+          <dgm:prSet phldr="1"/>
+        </dgm:pt>
+        <dgm:pt modelId="11">
+          <dgm:prSet phldr="1"/>
+        </dgm:pt>
+        <dgm:pt modelId="12">
+          <dgm:prSet phldr="1"/>
+        </dgm:pt>
+        <dgm:pt modelId="2">
+          <dgm:prSet phldr="1"/>
+        </dgm:pt>
+        <dgm:pt modelId="21">
+          <dgm:prSet phldr="1"/>
+        </dgm:pt>
+        <dgm:pt modelId="22">
+          <dgm:prSet phldr="1"/>
+        </dgm:pt>
+        <dgm:pt modelId="3">
+          <dgm:prSet phldr="1"/>
+        </dgm:pt>
+        <dgm:pt modelId="31">
+          <dgm:prSet phldr="1"/>
+        </dgm:pt>
+        <dgm:pt modelId="32">
+          <dgm:prSet phldr="1"/>
+        </dgm:pt>
+      </dgm:ptLst>
+      <dgm:cxnLst>
+        <dgm:cxn modelId="4" srcId="0" destId="1" srcOrd="0" destOrd="0"/>
+        <dgm:cxn modelId="5" srcId="0" destId="2" srcOrd="1" destOrd="0"/>
+        <dgm:cxn modelId="13" srcId="1" destId="11" srcOrd="0" destOrd="0"/>
+        <dgm:cxn modelId="14" srcId="1" destId="12" srcOrd="0" destOrd="0"/>
+        <dgm:cxn modelId="23" srcId="2" destId="21" srcOrd="0" destOrd="0"/>
+        <dgm:cxn modelId="24" srcId="2" destId="22" srcOrd="0" destOrd="0"/>
+        <dgm:cxn modelId="33" srcId="3" destId="31" srcOrd="0" destOrd="0"/>
+        <dgm:cxn modelId="34" srcId="3" destId="32" srcOrd="0" destOrd="0"/>
+      </dgm:cxnLst>
+      <dgm:bg/>
+      <dgm:whole/>
+    </dgm:dataModel>
+  </dgm:sampData>
+  <dgm:styleData>
+    <dgm:dataModel>
+      <dgm:ptLst>
+        <dgm:pt modelId="0" type="doc"/>
+        <dgm:pt modelId="1"/>
+        <dgm:pt modelId="11"/>
+        <dgm:pt modelId="2"/>
+        <dgm:pt modelId="21"/>
+      </dgm:ptLst>
+      <dgm:cxnLst>
+        <dgm:cxn modelId="4" srcId="0" destId="1" srcOrd="0" destOrd="0"/>
+        <dgm:cxn modelId="5" srcId="0" destId="2" srcOrd="1" destOrd="0"/>
+        <dgm:cxn modelId="13" srcId="1" destId="11" srcOrd="0" destOrd="0"/>
+        <dgm:cxn modelId="23" srcId="2" destId="21" srcOrd="0" destOrd="0"/>
+      </dgm:cxnLst>
+      <dgm:bg/>
+      <dgm:whole/>
+    </dgm:dataModel>
+  </dgm:styleData>
+  <dgm:clrData>
+    <dgm:dataModel>
+      <dgm:ptLst>
+        <dgm:pt modelId="0" type="doc"/>
+        <dgm:pt modelId="1"/>
+        <dgm:pt modelId="11"/>
+        <dgm:pt modelId="2"/>
+        <dgm:pt modelId="21"/>
+        <dgm:pt modelId="3"/>
+        <dgm:pt modelId="31"/>
+        <dgm:pt modelId="4"/>
+        <dgm:pt modelId="41"/>
+      </dgm:ptLst>
+      <dgm:cxnLst>
+        <dgm:cxn modelId="5" srcId="0" destId="1" srcOrd="0" destOrd="0"/>
+        <dgm:cxn modelId="6" srcId="0" destId="2" srcOrd="1" destOrd="0"/>
+        <dgm:cxn modelId="7" srcId="0" destId="3" srcOrd="2" destOrd="0"/>
+        <dgm:cxn modelId="8" srcId="0" destId="4" srcOrd="3" destOrd="0"/>
+        <dgm:cxn modelId="13" srcId="1" destId="11" srcOrd="0" destOrd="0"/>
+        <dgm:cxn modelId="23" srcId="2" destId="21" srcOrd="0" destOrd="0"/>
+        <dgm:cxn modelId="33" srcId="3" destId="31" srcOrd="0" destOrd="0"/>
+        <dgm:cxn modelId="43" srcId="4" destId="41" srcOrd="0" destOrd="0"/>
+      </dgm:cxnLst>
+      <dgm:bg/>
+      <dgm:whole/>
+    </dgm:dataModel>
+  </dgm:clrData>
+  <dgm:layoutNode name="theList">
+    <dgm:varLst>
+      <dgm:dir/>
+      <dgm:animLvl val="lvl"/>
+      <dgm:resizeHandles val="exact"/>
+    </dgm:varLst>
+    <dgm:choose name="Name0">
+      <dgm:if name="Name1" func="var" arg="dir" op="equ" val="norm">
+        <dgm:alg type="lin">
+          <dgm:param type="linDir" val="fromL"/>
+          <dgm:param type="nodeHorzAlign" val="l"/>
+        </dgm:alg>
+      </dgm:if>
+      <dgm:else name="Name2">
+        <dgm:alg type="lin">
+          <dgm:param type="linDir" val="fromR"/>
+          <dgm:param type="nodeHorzAlign" val="r"/>
+        </dgm:alg>
+      </dgm:else>
+    </dgm:choose>
+    <dgm:shape xmlns:r="http://schemas.openxmlformats.org/officeDocument/2006/relationships" r:blip="">
+      <dgm:adjLst/>
+    </dgm:shape>
+    <dgm:presOf/>
+    <dgm:constrLst>
+      <dgm:constr type="w" for="ch" forName="compNode" refType="w"/>
+      <dgm:constr type="h" for="ch" forName="compNode" refType="w" refFor="ch" refForName="compNode" fact="0.7"/>
+      <dgm:constr type="ctrY" for="ch" forName="compNode" refType="h" fact="0.5"/>
+      <dgm:constr type="w" for="ch" forName="aSpace" refType="w" fact="0.05"/>
+      <dgm:constr type="primFontSz" for="des" forName="childTextHidden" op="equ" val="65"/>
+      <dgm:constr type="primFontSz" for="des" forName="parentText" op="equ"/>
+    </dgm:constrLst>
+    <dgm:ruleLst/>
+    <dgm:forEach name="aNodeForEach" axis="ch" ptType="node">
+      <dgm:layoutNode name="compNode">
+        <dgm:alg type="composite">
+          <dgm:param type="ar" val="1.43"/>
+        </dgm:alg>
+        <dgm:shape xmlns:r="http://schemas.openxmlformats.org/officeDocument/2006/relationships" r:blip="">
+          <dgm:adjLst/>
+        </dgm:shape>
+        <dgm:presOf/>
+        <dgm:choose name="Name3">
+          <dgm:if name="Name4" func="var" arg="dir" op="equ" val="norm">
+            <dgm:constrLst>
+              <dgm:constr type="w" for="ch" forName="childTextVisible" refType="w" fact="0.8"/>
+              <dgm:constr type="h" for="ch" forName="childTextVisible" refType="h"/>
+              <dgm:constr type="r" for="ch" forName="childTextVisible" refType="w"/>
+              <dgm:constr type="w" for="ch" forName="childTextHidden" refType="w" fact="0.6"/>
+              <dgm:constr type="h" for="ch" forName="childTextHidden" refType="h"/>
+              <dgm:constr type="r" for="ch" forName="childTextHidden" refType="w"/>
+              <dgm:constr type="l" for="ch" forName="parentText"/>
+              <dgm:constr type="w" for="ch" forName="parentText" refType="w" fact="0.4"/>
+              <dgm:constr type="h" for="ch" forName="parentText" refType="w" refFor="ch" refForName="parentText" op="equ"/>
+              <dgm:constr type="ctrY" for="ch" forName="parentText" refType="h" fact="0.5"/>
+            </dgm:constrLst>
+          </dgm:if>
+          <dgm:else name="Name5">
+            <dgm:constrLst>
+              <dgm:constr type="w" for="ch" forName="childTextVisible" refType="w" fact="0.8"/>
+              <dgm:constr type="h" for="ch" forName="childTextVisible" refType="h"/>
+              <dgm:constr type="l" for="ch" forName="childTextVisible"/>
+              <dgm:constr type="w" for="ch" forName="childTextHidden" refType="w" fact="0.6"/>
+              <dgm:constr type="h" for="ch" forName="childTextHidden" refType="h"/>
+              <dgm:constr type="l" for="ch" forName="childTextHidden"/>
+              <dgm:constr type="r" for="ch" forName="parentText" refType="w"/>
+              <dgm:constr type="w" for="ch" forName="parentText" refType="w" fact="0.4"/>
+              <dgm:constr type="h" for="ch" forName="parentText" refType="w" refFor="ch" refForName="parentText" op="equ"/>
+              <dgm:constr type="ctrY" for="ch" forName="parentText" refType="h" fact="0.5"/>
+            </dgm:constrLst>
+          </dgm:else>
+        </dgm:choose>
+        <dgm:ruleLst/>
+        <dgm:layoutNode name="noGeometry">
+          <dgm:alg type="sp"/>
+          <dgm:shape xmlns:r="http://schemas.openxmlformats.org/officeDocument/2006/relationships" r:blip="">
+            <dgm:adjLst/>
+          </dgm:shape>
+          <dgm:presOf/>
+          <dgm:constrLst/>
+          <dgm:ruleLst/>
+        </dgm:layoutNode>
+        <dgm:layoutNode name="childTextVisible" styleLbl="bgAccFollowNode1">
+          <dgm:varLst>
+            <dgm:bulletEnabled val="1"/>
+          </dgm:varLst>
+          <dgm:alg type="sp"/>
+          <dgm:choose name="Name6">
+            <dgm:if name="Name7" func="var" arg="dir" op="equ" val="norm">
+              <dgm:shape xmlns:r="http://schemas.openxmlformats.org/officeDocument/2006/relationships" type="rightArrow" r:blip="">
+                <dgm:adjLst>
+                  <dgm:adj idx="1" val="0.7"/>
+                  <dgm:adj idx="2" val="0.5"/>
+                </dgm:adjLst>
+              </dgm:shape>
+            </dgm:if>
+            <dgm:else name="Name8">
+              <dgm:shape xmlns:r="http://schemas.openxmlformats.org/officeDocument/2006/relationships" type="leftArrow" r:blip="">
+                <dgm:adjLst>
+                  <dgm:adj idx="1" val="0.7"/>
+                  <dgm:adj idx="2" val="0.5"/>
+                </dgm:adjLst>
+              </dgm:shape>
+            </dgm:else>
+          </dgm:choose>
+          <dgm:presOf axis="des" ptType="node"/>
+          <dgm:constrLst/>
+          <dgm:ruleLst/>
+        </dgm:layoutNode>
+        <dgm:layoutNode name="childTextHidden" styleLbl="bgAccFollowNode1">
+          <dgm:choose name="Name9">
+            <dgm:if name="Name10" axis="des followSib" ptType="node node" st="1 1" cnt="1 0" func="cnt" op="gte" val="1">
+              <dgm:alg type="tx">
+                <dgm:param type="stBulletLvl" val="1"/>
+                <dgm:param type="txAnchorVertCh" val="mid"/>
+              </dgm:alg>
+            </dgm:if>
+            <dgm:else name="Name11">
+              <dgm:alg type="tx">
+                <dgm:param type="stBulletLvl" val="2"/>
+                <dgm:param type="txAnchorVertCh" val="mid"/>
+              </dgm:alg>
+            </dgm:else>
+          </dgm:choose>
+          <dgm:choose name="Name12">
+            <dgm:if name="Name13" func="var" arg="dir" op="equ" val="norm">
+              <dgm:shape xmlns:r="http://schemas.openxmlformats.org/officeDocument/2006/relationships" type="rightArrow" r:blip="" hideGeom="1">
+                <dgm:adjLst>
+                  <dgm:adj idx="1" val="0.7"/>
+                  <dgm:adj idx="2" val="0.5"/>
+                </dgm:adjLst>
+              </dgm:shape>
+            </dgm:if>
+            <dgm:else name="Name14">
+              <dgm:shape xmlns:r="http://schemas.openxmlformats.org/officeDocument/2006/relationships" type="leftArrow" r:blip="" hideGeom="1">
+                <dgm:adjLst>
+                  <dgm:adj idx="1" val="0.7"/>
+                  <dgm:adj idx="2" val="0.5"/>
+                </dgm:adjLst>
+              </dgm:shape>
+            </dgm:else>
+          </dgm:choose>
+          <dgm:presOf axis="des" ptType="node"/>
+          <dgm:constrLst>
+            <dgm:constr type="secFontSz" refType="primFontSz"/>
+            <dgm:constr type="tMarg" refType="primFontSz" fact="0.05"/>
+            <dgm:constr type="bMarg" refType="primFontSz" fact="0.05"/>
+            <dgm:constr type="rMarg" refType="primFontSz" fact="0.1"/>
+            <dgm:constr type="lMarg" refType="primFontSz" fact="0.2"/>
+          </dgm:constrLst>
+          <dgm:ruleLst>
+            <dgm:rule type="primFontSz" val="5" fact="NaN" max="NaN"/>
+          </dgm:ruleLst>
+        </dgm:layoutNode>
+        <dgm:layoutNode name="parentText" styleLbl="node1">
+          <dgm:varLst>
+            <dgm:chMax val="1"/>
+            <dgm:bulletEnabled val="1"/>
+          </dgm:varLst>
+          <dgm:alg type="tx"/>
+          <dgm:shape xmlns:r="http://schemas.openxmlformats.org/officeDocument/2006/relationships" type="ellipse" r:blip="">
+            <dgm:adjLst/>
+          </dgm:shape>
+          <dgm:presOf axis="self"/>
+          <dgm:constrLst>
+            <dgm:constr type="primFontSz" val="65"/>
+            <dgm:constr type="tMarg" refType="primFontSz" fact="0.05"/>
+            <dgm:constr type="bMarg" refType="primFontSz" fact="0.05"/>
+            <dgm:constr type="lMarg" refType="primFontSz" fact="0.05"/>
+            <dgm:constr type="rMarg" refType="primFontSz" fact="0.05"/>
+          </dgm:constrLst>
+          <dgm:ruleLst>
+            <dgm:rule type="primFontSz" val="5" fact="NaN" max="NaN"/>
+          </dgm:ruleLst>
+        </dgm:layoutNode>
+      </dgm:layoutNode>
+      <dgm:choose name="Name15">
+        <dgm:if name="Name16" axis="self" ptType="node" func="revPos" op="gte" val="2">
+          <dgm:layoutNode name="aSpace">
+            <dgm:alg type="sp"/>
+            <dgm:shape xmlns:r="http://schemas.openxmlformats.org/officeDocument/2006/relationships" r:blip="">
+              <dgm:adjLst/>
+            </dgm:shape>
+            <dgm:presOf/>
+            <dgm:constrLst/>
+            <dgm:ruleLst/>
+          </dgm:layoutNode>
+        </dgm:if>
+        <dgm:else name="Name17"/>
+      </dgm:choose>
+    </dgm:forEach>
+  </dgm:layoutNode>
+</dgm:layoutDef>
+</file>
+
 <file path=ppt/diagrams/quickStyle1.xml><?xml version="1.0" encoding="utf-8"?>
 <dgm:styleDef xmlns:dgm="http://schemas.openxmlformats.org/drawingml/2006/diagram" xmlns:a="http://schemas.openxmlformats.org/drawingml/2006/main" uniqueId="urn:microsoft.com/office/officeart/2005/8/quickstyle/simple1">
   <dgm:title val=""/>
@@ -4996,6 +6996,1040 @@
 </file>
 
 <file path=ppt/diagrams/quickStyle2.xml><?xml version="1.0" encoding="utf-8"?>
+<dgm:styleDef xmlns:dgm="http://schemas.openxmlformats.org/drawingml/2006/diagram" xmlns:a="http://schemas.openxmlformats.org/drawingml/2006/main" uniqueId="urn:microsoft.com/office/officeart/2005/8/quickstyle/simple1">
+  <dgm:title val=""/>
+  <dgm:desc val=""/>
+  <dgm:catLst>
+    <dgm:cat type="simple" pri="10100"/>
+  </dgm:catLst>
+  <dgm:scene3d>
+    <a:camera prst="orthographicFront"/>
+    <a:lightRig rig="threePt" dir="t"/>
+  </dgm:scene3d>
+  <dgm:styleLbl name="node0">
+    <dgm:scene3d>
+      <a:camera prst="orthographicFront"/>
+      <a:lightRig rig="threePt" dir="t"/>
+    </dgm:scene3d>
+    <dgm:sp3d/>
+    <dgm:txPr/>
+    <dgm:style>
+      <a:lnRef idx="2">
+        <a:scrgbClr r="0" g="0" b="0"/>
+      </a:lnRef>
+      <a:fillRef idx="1">
+        <a:scrgbClr r="0" g="0" b="0"/>
+      </a:fillRef>
+      <a:effectRef idx="0">
+        <a:scrgbClr r="0" g="0" b="0"/>
+      </a:effectRef>
+      <a:fontRef idx="minor">
+        <a:schemeClr val="lt1"/>
+      </a:fontRef>
+    </dgm:style>
+  </dgm:styleLbl>
+  <dgm:styleLbl name="lnNode1">
+    <dgm:scene3d>
+      <a:camera prst="orthographicFront"/>
+      <a:lightRig rig="threePt" dir="t"/>
+    </dgm:scene3d>
+    <dgm:sp3d/>
+    <dgm:txPr/>
+    <dgm:style>
+      <a:lnRef idx="2">
+        <a:scrgbClr r="0" g="0" b="0"/>
+      </a:lnRef>
+      <a:fillRef idx="1">
+        <a:scrgbClr r="0" g="0" b="0"/>
+      </a:fillRef>
+      <a:effectRef idx="0">
+        <a:scrgbClr r="0" g="0" b="0"/>
+      </a:effectRef>
+      <a:fontRef idx="minor">
+        <a:schemeClr val="lt1"/>
+      </a:fontRef>
+    </dgm:style>
+  </dgm:styleLbl>
+  <dgm:styleLbl name="vennNode1">
+    <dgm:scene3d>
+      <a:camera prst="orthographicFront"/>
+      <a:lightRig rig="threePt" dir="t"/>
+    </dgm:scene3d>
+    <dgm:sp3d/>
+    <dgm:txPr/>
+    <dgm:style>
+      <a:lnRef idx="2">
+        <a:scrgbClr r="0" g="0" b="0"/>
+      </a:lnRef>
+      <a:fillRef idx="1">
+        <a:scrgbClr r="0" g="0" b="0"/>
+      </a:fillRef>
+      <a:effectRef idx="0">
+        <a:scrgbClr r="0" g="0" b="0"/>
+      </a:effectRef>
+      <a:fontRef idx="minor">
+        <a:schemeClr val="tx1"/>
+      </a:fontRef>
+    </dgm:style>
+  </dgm:styleLbl>
+  <dgm:styleLbl name="alignNode1">
+    <dgm:scene3d>
+      <a:camera prst="orthographicFront"/>
+      <a:lightRig rig="threePt" dir="t"/>
+    </dgm:scene3d>
+    <dgm:sp3d/>
+    <dgm:txPr/>
+    <dgm:style>
+      <a:lnRef idx="2">
+        <a:scrgbClr r="0" g="0" b="0"/>
+      </a:lnRef>
+      <a:fillRef idx="1">
+        <a:scrgbClr r="0" g="0" b="0"/>
+      </a:fillRef>
+      <a:effectRef idx="0">
+        <a:scrgbClr r="0" g="0" b="0"/>
+      </a:effectRef>
+      <a:fontRef idx="minor">
+        <a:schemeClr val="lt1"/>
+      </a:fontRef>
+    </dgm:style>
+  </dgm:styleLbl>
+  <dgm:styleLbl name="node1">
+    <dgm:scene3d>
+      <a:camera prst="orthographicFront"/>
+      <a:lightRig rig="threePt" dir="t"/>
+    </dgm:scene3d>
+    <dgm:sp3d/>
+    <dgm:txPr/>
+    <dgm:style>
+      <a:lnRef idx="2">
+        <a:scrgbClr r="0" g="0" b="0"/>
+      </a:lnRef>
+      <a:fillRef idx="1">
+        <a:scrgbClr r="0" g="0" b="0"/>
+      </a:fillRef>
+      <a:effectRef idx="0">
+        <a:scrgbClr r="0" g="0" b="0"/>
+      </a:effectRef>
+      <a:fontRef idx="minor">
+        <a:schemeClr val="lt1"/>
+      </a:fontRef>
+    </dgm:style>
+  </dgm:styleLbl>
+  <dgm:styleLbl name="node2">
+    <dgm:scene3d>
+      <a:camera prst="orthographicFront"/>
+      <a:lightRig rig="threePt" dir="t"/>
+    </dgm:scene3d>
+    <dgm:sp3d/>
+    <dgm:txPr/>
+    <dgm:style>
+      <a:lnRef idx="2">
+        <a:scrgbClr r="0" g="0" b="0"/>
+      </a:lnRef>
+      <a:fillRef idx="1">
+        <a:scrgbClr r="0" g="0" b="0"/>
+      </a:fillRef>
+      <a:effectRef idx="0">
+        <a:scrgbClr r="0" g="0" b="0"/>
+      </a:effectRef>
+      <a:fontRef idx="minor">
+        <a:schemeClr val="lt1"/>
+      </a:fontRef>
+    </dgm:style>
+  </dgm:styleLbl>
+  <dgm:styleLbl name="node3">
+    <dgm:scene3d>
+      <a:camera prst="orthographicFront"/>
+      <a:lightRig rig="threePt" dir="t"/>
+    </dgm:scene3d>
+    <dgm:sp3d/>
+    <dgm:txPr/>
+    <dgm:style>
+      <a:lnRef idx="2">
+        <a:scrgbClr r="0" g="0" b="0"/>
+      </a:lnRef>
+      <a:fillRef idx="1">
+        <a:scrgbClr r="0" g="0" b="0"/>
+      </a:fillRef>
+      <a:effectRef idx="0">
+        <a:scrgbClr r="0" g="0" b="0"/>
+      </a:effectRef>
+      <a:fontRef idx="minor">
+        <a:schemeClr val="lt1"/>
+      </a:fontRef>
+    </dgm:style>
+  </dgm:styleLbl>
+  <dgm:styleLbl name="node4">
+    <dgm:scene3d>
+      <a:camera prst="orthographicFront"/>
+      <a:lightRig rig="threePt" dir="t"/>
+    </dgm:scene3d>
+    <dgm:sp3d/>
+    <dgm:txPr/>
+    <dgm:style>
+      <a:lnRef idx="2">
+        <a:scrgbClr r="0" g="0" b="0"/>
+      </a:lnRef>
+      <a:fillRef idx="1">
+        <a:scrgbClr r="0" g="0" b="0"/>
+      </a:fillRef>
+      <a:effectRef idx="0">
+        <a:scrgbClr r="0" g="0" b="0"/>
+      </a:effectRef>
+      <a:fontRef idx="minor">
+        <a:schemeClr val="lt1"/>
+      </a:fontRef>
+    </dgm:style>
+  </dgm:styleLbl>
+  <dgm:styleLbl name="fgImgPlace1">
+    <dgm:scene3d>
+      <a:camera prst="orthographicFront"/>
+      <a:lightRig rig="threePt" dir="t"/>
+    </dgm:scene3d>
+    <dgm:sp3d/>
+    <dgm:txPr/>
+    <dgm:style>
+      <a:lnRef idx="2">
+        <a:scrgbClr r="0" g="0" b="0"/>
+      </a:lnRef>
+      <a:fillRef idx="1">
+        <a:scrgbClr r="0" g="0" b="0"/>
+      </a:fillRef>
+      <a:effectRef idx="0">
+        <a:scrgbClr r="0" g="0" b="0"/>
+      </a:effectRef>
+      <a:fontRef idx="minor"/>
+    </dgm:style>
+  </dgm:styleLbl>
+  <dgm:styleLbl name="alignImgPlace1">
+    <dgm:scene3d>
+      <a:camera prst="orthographicFront"/>
+      <a:lightRig rig="threePt" dir="t"/>
+    </dgm:scene3d>
+    <dgm:sp3d/>
+    <dgm:txPr/>
+    <dgm:style>
+      <a:lnRef idx="2">
+        <a:scrgbClr r="0" g="0" b="0"/>
+      </a:lnRef>
+      <a:fillRef idx="1">
+        <a:scrgbClr r="0" g="0" b="0"/>
+      </a:fillRef>
+      <a:effectRef idx="0">
+        <a:scrgbClr r="0" g="0" b="0"/>
+      </a:effectRef>
+      <a:fontRef idx="minor"/>
+    </dgm:style>
+  </dgm:styleLbl>
+  <dgm:styleLbl name="bgImgPlace1">
+    <dgm:scene3d>
+      <a:camera prst="orthographicFront"/>
+      <a:lightRig rig="threePt" dir="t"/>
+    </dgm:scene3d>
+    <dgm:sp3d/>
+    <dgm:txPr/>
+    <dgm:style>
+      <a:lnRef idx="2">
+        <a:scrgbClr r="0" g="0" b="0"/>
+      </a:lnRef>
+      <a:fillRef idx="1">
+        <a:scrgbClr r="0" g="0" b="0"/>
+      </a:fillRef>
+      <a:effectRef idx="0">
+        <a:scrgbClr r="0" g="0" b="0"/>
+      </a:effectRef>
+      <a:fontRef idx="minor"/>
+    </dgm:style>
+  </dgm:styleLbl>
+  <dgm:styleLbl name="sibTrans2D1">
+    <dgm:scene3d>
+      <a:camera prst="orthographicFront"/>
+      <a:lightRig rig="threePt" dir="t"/>
+    </dgm:scene3d>
+    <dgm:sp3d/>
+    <dgm:txPr/>
+    <dgm:style>
+      <a:lnRef idx="0">
+        <a:scrgbClr r="0" g="0" b="0"/>
+      </a:lnRef>
+      <a:fillRef idx="1">
+        <a:scrgbClr r="0" g="0" b="0"/>
+      </a:fillRef>
+      <a:effectRef idx="0">
+        <a:scrgbClr r="0" g="0" b="0"/>
+      </a:effectRef>
+      <a:fontRef idx="minor">
+        <a:schemeClr val="lt1"/>
+      </a:fontRef>
+    </dgm:style>
+  </dgm:styleLbl>
+  <dgm:styleLbl name="fgSibTrans2D1">
+    <dgm:scene3d>
+      <a:camera prst="orthographicFront"/>
+      <a:lightRig rig="threePt" dir="t"/>
+    </dgm:scene3d>
+    <dgm:sp3d/>
+    <dgm:txPr/>
+    <dgm:style>
+      <a:lnRef idx="0">
+        <a:scrgbClr r="0" g="0" b="0"/>
+      </a:lnRef>
+      <a:fillRef idx="1">
+        <a:scrgbClr r="0" g="0" b="0"/>
+      </a:fillRef>
+      <a:effectRef idx="0">
+        <a:scrgbClr r="0" g="0" b="0"/>
+      </a:effectRef>
+      <a:fontRef idx="minor">
+        <a:schemeClr val="lt1"/>
+      </a:fontRef>
+    </dgm:style>
+  </dgm:styleLbl>
+  <dgm:styleLbl name="bgSibTrans2D1">
+    <dgm:scene3d>
+      <a:camera prst="orthographicFront"/>
+      <a:lightRig rig="threePt" dir="t"/>
+    </dgm:scene3d>
+    <dgm:sp3d/>
+    <dgm:txPr/>
+    <dgm:style>
+      <a:lnRef idx="0">
+        <a:scrgbClr r="0" g="0" b="0"/>
+      </a:lnRef>
+      <a:fillRef idx="1">
+        <a:scrgbClr r="0" g="0" b="0"/>
+      </a:fillRef>
+      <a:effectRef idx="0">
+        <a:scrgbClr r="0" g="0" b="0"/>
+      </a:effectRef>
+      <a:fontRef idx="minor">
+        <a:schemeClr val="lt1"/>
+      </a:fontRef>
+    </dgm:style>
+  </dgm:styleLbl>
+  <dgm:styleLbl name="sibTrans1D1">
+    <dgm:scene3d>
+      <a:camera prst="orthographicFront"/>
+      <a:lightRig rig="threePt" dir="t"/>
+    </dgm:scene3d>
+    <dgm:sp3d/>
+    <dgm:txPr/>
+    <dgm:style>
+      <a:lnRef idx="1">
+        <a:scrgbClr r="0" g="0" b="0"/>
+      </a:lnRef>
+      <a:fillRef idx="0">
+        <a:scrgbClr r="0" g="0" b="0"/>
+      </a:fillRef>
+      <a:effectRef idx="0">
+        <a:scrgbClr r="0" g="0" b="0"/>
+      </a:effectRef>
+      <a:fontRef idx="minor"/>
+    </dgm:style>
+  </dgm:styleLbl>
+  <dgm:styleLbl name="callout">
+    <dgm:scene3d>
+      <a:camera prst="orthographicFront"/>
+      <a:lightRig rig="threePt" dir="t"/>
+    </dgm:scene3d>
+    <dgm:sp3d/>
+    <dgm:txPr/>
+    <dgm:style>
+      <a:lnRef idx="2">
+        <a:scrgbClr r="0" g="0" b="0"/>
+      </a:lnRef>
+      <a:fillRef idx="1">
+        <a:scrgbClr r="0" g="0" b="0"/>
+      </a:fillRef>
+      <a:effectRef idx="0">
+        <a:scrgbClr r="0" g="0" b="0"/>
+      </a:effectRef>
+      <a:fontRef idx="minor"/>
+    </dgm:style>
+  </dgm:styleLbl>
+  <dgm:styleLbl name="asst0">
+    <dgm:scene3d>
+      <a:camera prst="orthographicFront"/>
+      <a:lightRig rig="threePt" dir="t"/>
+    </dgm:scene3d>
+    <dgm:sp3d/>
+    <dgm:txPr/>
+    <dgm:style>
+      <a:lnRef idx="2">
+        <a:scrgbClr r="0" g="0" b="0"/>
+      </a:lnRef>
+      <a:fillRef idx="1">
+        <a:scrgbClr r="0" g="0" b="0"/>
+      </a:fillRef>
+      <a:effectRef idx="0">
+        <a:scrgbClr r="0" g="0" b="0"/>
+      </a:effectRef>
+      <a:fontRef idx="minor">
+        <a:schemeClr val="lt1"/>
+      </a:fontRef>
+    </dgm:style>
+  </dgm:styleLbl>
+  <dgm:styleLbl name="asst1">
+    <dgm:scene3d>
+      <a:camera prst="orthographicFront"/>
+      <a:lightRig rig="threePt" dir="t"/>
+    </dgm:scene3d>
+    <dgm:sp3d/>
+    <dgm:txPr/>
+    <dgm:style>
+      <a:lnRef idx="2">
+        <a:scrgbClr r="0" g="0" b="0"/>
+      </a:lnRef>
+      <a:fillRef idx="1">
+        <a:scrgbClr r="0" g="0" b="0"/>
+      </a:fillRef>
+      <a:effectRef idx="0">
+        <a:scrgbClr r="0" g="0" b="0"/>
+      </a:effectRef>
+      <a:fontRef idx="minor">
+        <a:schemeClr val="lt1"/>
+      </a:fontRef>
+    </dgm:style>
+  </dgm:styleLbl>
+  <dgm:styleLbl name="asst2">
+    <dgm:scene3d>
+      <a:camera prst="orthographicFront"/>
+      <a:lightRig rig="threePt" dir="t"/>
+    </dgm:scene3d>
+    <dgm:sp3d/>
+    <dgm:txPr/>
+    <dgm:style>
+      <a:lnRef idx="2">
+        <a:scrgbClr r="0" g="0" b="0"/>
+      </a:lnRef>
+      <a:fillRef idx="1">
+        <a:scrgbClr r="0" g="0" b="0"/>
+      </a:fillRef>
+      <a:effectRef idx="0">
+        <a:scrgbClr r="0" g="0" b="0"/>
+      </a:effectRef>
+      <a:fontRef idx="minor">
+        <a:schemeClr val="lt1"/>
+      </a:fontRef>
+    </dgm:style>
+  </dgm:styleLbl>
+  <dgm:styleLbl name="asst3">
+    <dgm:scene3d>
+      <a:camera prst="orthographicFront"/>
+      <a:lightRig rig="threePt" dir="t"/>
+    </dgm:scene3d>
+    <dgm:sp3d/>
+    <dgm:txPr/>
+    <dgm:style>
+      <a:lnRef idx="2">
+        <a:scrgbClr r="0" g="0" b="0"/>
+      </a:lnRef>
+      <a:fillRef idx="1">
+        <a:scrgbClr r="0" g="0" b="0"/>
+      </a:fillRef>
+      <a:effectRef idx="0">
+        <a:scrgbClr r="0" g="0" b="0"/>
+      </a:effectRef>
+      <a:fontRef idx="minor">
+        <a:schemeClr val="lt1"/>
+      </a:fontRef>
+    </dgm:style>
+  </dgm:styleLbl>
+  <dgm:styleLbl name="asst4">
+    <dgm:scene3d>
+      <a:camera prst="orthographicFront"/>
+      <a:lightRig rig="threePt" dir="t"/>
+    </dgm:scene3d>
+    <dgm:sp3d/>
+    <dgm:txPr/>
+    <dgm:style>
+      <a:lnRef idx="2">
+        <a:scrgbClr r="0" g="0" b="0"/>
+      </a:lnRef>
+      <a:fillRef idx="1">
+        <a:scrgbClr r="0" g="0" b="0"/>
+      </a:fillRef>
+      <a:effectRef idx="0">
+        <a:scrgbClr r="0" g="0" b="0"/>
+      </a:effectRef>
+      <a:fontRef idx="minor">
+        <a:schemeClr val="lt1"/>
+      </a:fontRef>
+    </dgm:style>
+  </dgm:styleLbl>
+  <dgm:styleLbl name="parChTrans2D1">
+    <dgm:scene3d>
+      <a:camera prst="orthographicFront"/>
+      <a:lightRig rig="threePt" dir="t"/>
+    </dgm:scene3d>
+    <dgm:sp3d/>
+    <dgm:txPr/>
+    <dgm:style>
+      <a:lnRef idx="2">
+        <a:scrgbClr r="0" g="0" b="0"/>
+      </a:lnRef>
+      <a:fillRef idx="1">
+        <a:scrgbClr r="0" g="0" b="0"/>
+      </a:fillRef>
+      <a:effectRef idx="0">
+        <a:scrgbClr r="0" g="0" b="0"/>
+      </a:effectRef>
+      <a:fontRef idx="minor">
+        <a:schemeClr val="lt1"/>
+      </a:fontRef>
+    </dgm:style>
+  </dgm:styleLbl>
+  <dgm:styleLbl name="parChTrans2D2">
+    <dgm:scene3d>
+      <a:camera prst="orthographicFront"/>
+      <a:lightRig rig="threePt" dir="t"/>
+    </dgm:scene3d>
+    <dgm:sp3d/>
+    <dgm:txPr/>
+    <dgm:style>
+      <a:lnRef idx="2">
+        <a:scrgbClr r="0" g="0" b="0"/>
+      </a:lnRef>
+      <a:fillRef idx="1">
+        <a:scrgbClr r="0" g="0" b="0"/>
+      </a:fillRef>
+      <a:effectRef idx="0">
+        <a:scrgbClr r="0" g="0" b="0"/>
+      </a:effectRef>
+      <a:fontRef idx="minor">
+        <a:schemeClr val="lt1"/>
+      </a:fontRef>
+    </dgm:style>
+  </dgm:styleLbl>
+  <dgm:styleLbl name="parChTrans2D3">
+    <dgm:scene3d>
+      <a:camera prst="orthographicFront"/>
+      <a:lightRig rig="threePt" dir="t"/>
+    </dgm:scene3d>
+    <dgm:sp3d/>
+    <dgm:txPr/>
+    <dgm:style>
+      <a:lnRef idx="2">
+        <a:scrgbClr r="0" g="0" b="0"/>
+      </a:lnRef>
+      <a:fillRef idx="1">
+        <a:scrgbClr r="0" g="0" b="0"/>
+      </a:fillRef>
+      <a:effectRef idx="0">
+        <a:scrgbClr r="0" g="0" b="0"/>
+      </a:effectRef>
+      <a:fontRef idx="minor">
+        <a:schemeClr val="lt1"/>
+      </a:fontRef>
+    </dgm:style>
+  </dgm:styleLbl>
+  <dgm:styleLbl name="parChTrans2D4">
+    <dgm:scene3d>
+      <a:camera prst="orthographicFront"/>
+      <a:lightRig rig="threePt" dir="t"/>
+    </dgm:scene3d>
+    <dgm:sp3d/>
+    <dgm:txPr/>
+    <dgm:style>
+      <a:lnRef idx="2">
+        <a:scrgbClr r="0" g="0" b="0"/>
+      </a:lnRef>
+      <a:fillRef idx="1">
+        <a:scrgbClr r="0" g="0" b="0"/>
+      </a:fillRef>
+      <a:effectRef idx="0">
+        <a:scrgbClr r="0" g="0" b="0"/>
+      </a:effectRef>
+      <a:fontRef idx="minor">
+        <a:schemeClr val="lt1"/>
+      </a:fontRef>
+    </dgm:style>
+  </dgm:styleLbl>
+  <dgm:styleLbl name="parChTrans1D1">
+    <dgm:scene3d>
+      <a:camera prst="orthographicFront"/>
+      <a:lightRig rig="threePt" dir="t"/>
+    </dgm:scene3d>
+    <dgm:sp3d/>
+    <dgm:txPr/>
+    <dgm:style>
+      <a:lnRef idx="2">
+        <a:scrgbClr r="0" g="0" b="0"/>
+      </a:lnRef>
+      <a:fillRef idx="0">
+        <a:scrgbClr r="0" g="0" b="0"/>
+      </a:fillRef>
+      <a:effectRef idx="0">
+        <a:scrgbClr r="0" g="0" b="0"/>
+      </a:effectRef>
+      <a:fontRef idx="minor"/>
+    </dgm:style>
+  </dgm:styleLbl>
+  <dgm:styleLbl name="parChTrans1D2">
+    <dgm:scene3d>
+      <a:camera prst="orthographicFront"/>
+      <a:lightRig rig="threePt" dir="t"/>
+    </dgm:scene3d>
+    <dgm:sp3d/>
+    <dgm:txPr/>
+    <dgm:style>
+      <a:lnRef idx="2">
+        <a:scrgbClr r="0" g="0" b="0"/>
+      </a:lnRef>
+      <a:fillRef idx="0">
+        <a:scrgbClr r="0" g="0" b="0"/>
+      </a:fillRef>
+      <a:effectRef idx="0">
+        <a:scrgbClr r="0" g="0" b="0"/>
+      </a:effectRef>
+      <a:fontRef idx="minor"/>
+    </dgm:style>
+  </dgm:styleLbl>
+  <dgm:styleLbl name="parChTrans1D3">
+    <dgm:scene3d>
+      <a:camera prst="orthographicFront"/>
+      <a:lightRig rig="threePt" dir="t"/>
+    </dgm:scene3d>
+    <dgm:sp3d/>
+    <dgm:txPr/>
+    <dgm:style>
+      <a:lnRef idx="2">
+        <a:scrgbClr r="0" g="0" b="0"/>
+      </a:lnRef>
+      <a:fillRef idx="0">
+        <a:scrgbClr r="0" g="0" b="0"/>
+      </a:fillRef>
+      <a:effectRef idx="0">
+        <a:scrgbClr r="0" g="0" b="0"/>
+      </a:effectRef>
+      <a:fontRef idx="minor"/>
+    </dgm:style>
+  </dgm:styleLbl>
+  <dgm:styleLbl name="parChTrans1D4">
+    <dgm:scene3d>
+      <a:camera prst="orthographicFront"/>
+      <a:lightRig rig="threePt" dir="t"/>
+    </dgm:scene3d>
+    <dgm:sp3d/>
+    <dgm:txPr/>
+    <dgm:style>
+      <a:lnRef idx="2">
+        <a:scrgbClr r="0" g="0" b="0"/>
+      </a:lnRef>
+      <a:fillRef idx="0">
+        <a:scrgbClr r="0" g="0" b="0"/>
+      </a:fillRef>
+      <a:effectRef idx="0">
+        <a:scrgbClr r="0" g="0" b="0"/>
+      </a:effectRef>
+      <a:fontRef idx="minor"/>
+    </dgm:style>
+  </dgm:styleLbl>
+  <dgm:styleLbl name="fgAcc1">
+    <dgm:scene3d>
+      <a:camera prst="orthographicFront"/>
+      <a:lightRig rig="threePt" dir="t"/>
+    </dgm:scene3d>
+    <dgm:sp3d/>
+    <dgm:txPr/>
+    <dgm:style>
+      <a:lnRef idx="2">
+        <a:scrgbClr r="0" g="0" b="0"/>
+      </a:lnRef>
+      <a:fillRef idx="1">
+        <a:scrgbClr r="0" g="0" b="0"/>
+      </a:fillRef>
+      <a:effectRef idx="0">
+        <a:scrgbClr r="0" g="0" b="0"/>
+      </a:effectRef>
+      <a:fontRef idx="minor"/>
+    </dgm:style>
+  </dgm:styleLbl>
+  <dgm:styleLbl name="conFgAcc1">
+    <dgm:scene3d>
+      <a:camera prst="orthographicFront"/>
+      <a:lightRig rig="threePt" dir="t"/>
+    </dgm:scene3d>
+    <dgm:sp3d/>
+    <dgm:txPr/>
+    <dgm:style>
+      <a:lnRef idx="2">
+        <a:scrgbClr r="0" g="0" b="0"/>
+      </a:lnRef>
+      <a:fillRef idx="1">
+        <a:scrgbClr r="0" g="0" b="0"/>
+      </a:fillRef>
+      <a:effectRef idx="0">
+        <a:scrgbClr r="0" g="0" b="0"/>
+      </a:effectRef>
+      <a:fontRef idx="minor"/>
+    </dgm:style>
+  </dgm:styleLbl>
+  <dgm:styleLbl name="alignAcc1">
+    <dgm:scene3d>
+      <a:camera prst="orthographicFront"/>
+      <a:lightRig rig="threePt" dir="t"/>
+    </dgm:scene3d>
+    <dgm:sp3d/>
+    <dgm:txPr/>
+    <dgm:style>
+      <a:lnRef idx="2">
+        <a:scrgbClr r="0" g="0" b="0"/>
+      </a:lnRef>
+      <a:fillRef idx="1">
+        <a:scrgbClr r="0" g="0" b="0"/>
+      </a:fillRef>
+      <a:effectRef idx="0">
+        <a:scrgbClr r="0" g="0" b="0"/>
+      </a:effectRef>
+      <a:fontRef idx="minor"/>
+    </dgm:style>
+  </dgm:styleLbl>
+  <dgm:styleLbl name="trAlignAcc1">
+    <dgm:scene3d>
+      <a:camera prst="orthographicFront"/>
+      <a:lightRig rig="threePt" dir="t"/>
+    </dgm:scene3d>
+    <dgm:sp3d/>
+    <dgm:txPr/>
+    <dgm:style>
+      <a:lnRef idx="1">
+        <a:scrgbClr r="0" g="0" b="0"/>
+      </a:lnRef>
+      <a:fillRef idx="1">
+        <a:scrgbClr r="0" g="0" b="0"/>
+      </a:fillRef>
+      <a:effectRef idx="0">
+        <a:scrgbClr r="0" g="0" b="0"/>
+      </a:effectRef>
+      <a:fontRef idx="minor"/>
+    </dgm:style>
+  </dgm:styleLbl>
+  <dgm:styleLbl name="bgAcc1">
+    <dgm:scene3d>
+      <a:camera prst="orthographicFront"/>
+      <a:lightRig rig="threePt" dir="t"/>
+    </dgm:scene3d>
+    <dgm:sp3d/>
+    <dgm:txPr/>
+    <dgm:style>
+      <a:lnRef idx="2">
+        <a:scrgbClr r="0" g="0" b="0"/>
+      </a:lnRef>
+      <a:fillRef idx="1">
+        <a:scrgbClr r="0" g="0" b="0"/>
+      </a:fillRef>
+      <a:effectRef idx="0">
+        <a:scrgbClr r="0" g="0" b="0"/>
+      </a:effectRef>
+      <a:fontRef idx="minor"/>
+    </dgm:style>
+  </dgm:styleLbl>
+  <dgm:styleLbl name="solidFgAcc1">
+    <dgm:scene3d>
+      <a:camera prst="orthographicFront"/>
+      <a:lightRig rig="threePt" dir="t"/>
+    </dgm:scene3d>
+    <dgm:sp3d/>
+    <dgm:txPr/>
+    <dgm:style>
+      <a:lnRef idx="2">
+        <a:scrgbClr r="0" g="0" b="0"/>
+      </a:lnRef>
+      <a:fillRef idx="1">
+        <a:scrgbClr r="0" g="0" b="0"/>
+      </a:fillRef>
+      <a:effectRef idx="0">
+        <a:scrgbClr r="0" g="0" b="0"/>
+      </a:effectRef>
+      <a:fontRef idx="minor"/>
+    </dgm:style>
+  </dgm:styleLbl>
+  <dgm:styleLbl name="solidAlignAcc1">
+    <dgm:scene3d>
+      <a:camera prst="orthographicFront"/>
+      <a:lightRig rig="threePt" dir="t"/>
+    </dgm:scene3d>
+    <dgm:sp3d/>
+    <dgm:txPr/>
+    <dgm:style>
+      <a:lnRef idx="2">
+        <a:scrgbClr r="0" g="0" b="0"/>
+      </a:lnRef>
+      <a:fillRef idx="1">
+        <a:scrgbClr r="0" g="0" b="0"/>
+      </a:fillRef>
+      <a:effectRef idx="0">
+        <a:scrgbClr r="0" g="0" b="0"/>
+      </a:effectRef>
+      <a:fontRef idx="minor"/>
+    </dgm:style>
+  </dgm:styleLbl>
+  <dgm:styleLbl name="solidBgAcc1">
+    <dgm:scene3d>
+      <a:camera prst="orthographicFront"/>
+      <a:lightRig rig="threePt" dir="t"/>
+    </dgm:scene3d>
+    <dgm:sp3d/>
+    <dgm:txPr/>
+    <dgm:style>
+      <a:lnRef idx="2">
+        <a:scrgbClr r="0" g="0" b="0"/>
+      </a:lnRef>
+      <a:fillRef idx="1">
+        <a:scrgbClr r="0" g="0" b="0"/>
+      </a:fillRef>
+      <a:effectRef idx="0">
+        <a:scrgbClr r="0" g="0" b="0"/>
+      </a:effectRef>
+      <a:fontRef idx="minor"/>
+    </dgm:style>
+  </dgm:styleLbl>
+  <dgm:styleLbl name="fgAccFollowNode1">
+    <dgm:scene3d>
+      <a:camera prst="orthographicFront"/>
+      <a:lightRig rig="threePt" dir="t"/>
+    </dgm:scene3d>
+    <dgm:sp3d/>
+    <dgm:txPr/>
+    <dgm:style>
+      <a:lnRef idx="2">
+        <a:scrgbClr r="0" g="0" b="0"/>
+      </a:lnRef>
+      <a:fillRef idx="1">
+        <a:scrgbClr r="0" g="0" b="0"/>
+      </a:fillRef>
+      <a:effectRef idx="0">
+        <a:scrgbClr r="0" g="0" b="0"/>
+      </a:effectRef>
+      <a:fontRef idx="minor"/>
+    </dgm:style>
+  </dgm:styleLbl>
+  <dgm:styleLbl name="alignAccFollowNode1">
+    <dgm:scene3d>
+      <a:camera prst="orthographicFront"/>
+      <a:lightRig rig="threePt" dir="t"/>
+    </dgm:scene3d>
+    <dgm:sp3d/>
+    <dgm:txPr/>
+    <dgm:style>
+      <a:lnRef idx="2">
+        <a:scrgbClr r="0" g="0" b="0"/>
+      </a:lnRef>
+      <a:fillRef idx="1">
+        <a:scrgbClr r="0" g="0" b="0"/>
+      </a:fillRef>
+      <a:effectRef idx="0">
+        <a:scrgbClr r="0" g="0" b="0"/>
+      </a:effectRef>
+      <a:fontRef idx="minor"/>
+    </dgm:style>
+  </dgm:styleLbl>
+  <dgm:styleLbl name="bgAccFollowNode1">
+    <dgm:scene3d>
+      <a:camera prst="orthographicFront"/>
+      <a:lightRig rig="threePt" dir="t"/>
+    </dgm:scene3d>
+    <dgm:sp3d/>
+    <dgm:txPr/>
+    <dgm:style>
+      <a:lnRef idx="2">
+        <a:scrgbClr r="0" g="0" b="0"/>
+      </a:lnRef>
+      <a:fillRef idx="1">
+        <a:scrgbClr r="0" g="0" b="0"/>
+      </a:fillRef>
+      <a:effectRef idx="0">
+        <a:scrgbClr r="0" g="0" b="0"/>
+      </a:effectRef>
+      <a:fontRef idx="minor"/>
+    </dgm:style>
+  </dgm:styleLbl>
+  <dgm:styleLbl name="fgAcc0">
+    <dgm:scene3d>
+      <a:camera prst="orthographicFront"/>
+      <a:lightRig rig="threePt" dir="t"/>
+    </dgm:scene3d>
+    <dgm:sp3d/>
+    <dgm:txPr/>
+    <dgm:style>
+      <a:lnRef idx="2">
+        <a:scrgbClr r="0" g="0" b="0"/>
+      </a:lnRef>
+      <a:fillRef idx="1">
+        <a:scrgbClr r="0" g="0" b="0"/>
+      </a:fillRef>
+      <a:effectRef idx="0">
+        <a:scrgbClr r="0" g="0" b="0"/>
+      </a:effectRef>
+      <a:fontRef idx="minor"/>
+    </dgm:style>
+  </dgm:styleLbl>
+  <dgm:styleLbl name="fgAcc2">
+    <dgm:scene3d>
+      <a:camera prst="orthographicFront"/>
+      <a:lightRig rig="threePt" dir="t"/>
+    </dgm:scene3d>
+    <dgm:sp3d/>
+    <dgm:txPr/>
+    <dgm:style>
+      <a:lnRef idx="2">
+        <a:scrgbClr r="0" g="0" b="0"/>
+      </a:lnRef>
+      <a:fillRef idx="1">
+        <a:scrgbClr r="0" g="0" b="0"/>
+      </a:fillRef>
+      <a:effectRef idx="0">
+        <a:scrgbClr r="0" g="0" b="0"/>
+      </a:effectRef>
+      <a:fontRef idx="minor"/>
+    </dgm:style>
+  </dgm:styleLbl>
+  <dgm:styleLbl name="fgAcc3">
+    <dgm:scene3d>
+      <a:camera prst="orthographicFront"/>
+      <a:lightRig rig="threePt" dir="t"/>
+    </dgm:scene3d>
+    <dgm:sp3d/>
+    <dgm:txPr/>
+    <dgm:style>
+      <a:lnRef idx="2">
+        <a:scrgbClr r="0" g="0" b="0"/>
+      </a:lnRef>
+      <a:fillRef idx="1">
+        <a:scrgbClr r="0" g="0" b="0"/>
+      </a:fillRef>
+      <a:effectRef idx="0">
+        <a:scrgbClr r="0" g="0" b="0"/>
+      </a:effectRef>
+      <a:fontRef idx="minor"/>
+    </dgm:style>
+  </dgm:styleLbl>
+  <dgm:styleLbl name="fgAcc4">
+    <dgm:scene3d>
+      <a:camera prst="orthographicFront"/>
+      <a:lightRig rig="threePt" dir="t"/>
+    </dgm:scene3d>
+    <dgm:sp3d/>
+    <dgm:txPr/>
+    <dgm:style>
+      <a:lnRef idx="2">
+        <a:scrgbClr r="0" g="0" b="0"/>
+      </a:lnRef>
+      <a:fillRef idx="1">
+        <a:scrgbClr r="0" g="0" b="0"/>
+      </a:fillRef>
+      <a:effectRef idx="0">
+        <a:scrgbClr r="0" g="0" b="0"/>
+      </a:effectRef>
+      <a:fontRef idx="minor"/>
+    </dgm:style>
+  </dgm:styleLbl>
+  <dgm:styleLbl name="bgShp">
+    <dgm:scene3d>
+      <a:camera prst="orthographicFront"/>
+      <a:lightRig rig="threePt" dir="t"/>
+    </dgm:scene3d>
+    <dgm:sp3d/>
+    <dgm:txPr/>
+    <dgm:style>
+      <a:lnRef idx="0">
+        <a:scrgbClr r="0" g="0" b="0"/>
+      </a:lnRef>
+      <a:fillRef idx="1">
+        <a:scrgbClr r="0" g="0" b="0"/>
+      </a:fillRef>
+      <a:effectRef idx="0">
+        <a:scrgbClr r="0" g="0" b="0"/>
+      </a:effectRef>
+      <a:fontRef idx="minor"/>
+    </dgm:style>
+  </dgm:styleLbl>
+  <dgm:styleLbl name="dkBgShp">
+    <dgm:scene3d>
+      <a:camera prst="orthographicFront"/>
+      <a:lightRig rig="threePt" dir="t"/>
+    </dgm:scene3d>
+    <dgm:sp3d/>
+    <dgm:txPr/>
+    <dgm:style>
+      <a:lnRef idx="0">
+        <a:scrgbClr r="0" g="0" b="0"/>
+      </a:lnRef>
+      <a:fillRef idx="1">
+        <a:scrgbClr r="0" g="0" b="0"/>
+      </a:fillRef>
+      <a:effectRef idx="0">
+        <a:scrgbClr r="0" g="0" b="0"/>
+      </a:effectRef>
+      <a:fontRef idx="minor"/>
+    </dgm:style>
+  </dgm:styleLbl>
+  <dgm:styleLbl name="trBgShp">
+    <dgm:scene3d>
+      <a:camera prst="orthographicFront"/>
+      <a:lightRig rig="threePt" dir="t"/>
+    </dgm:scene3d>
+    <dgm:sp3d/>
+    <dgm:txPr/>
+    <dgm:style>
+      <a:lnRef idx="0">
+        <a:scrgbClr r="0" g="0" b="0"/>
+      </a:lnRef>
+      <a:fillRef idx="1">
+        <a:scrgbClr r="0" g="0" b="0"/>
+      </a:fillRef>
+      <a:effectRef idx="0">
+        <a:scrgbClr r="0" g="0" b="0"/>
+      </a:effectRef>
+      <a:fontRef idx="minor"/>
+    </dgm:style>
+  </dgm:styleLbl>
+  <dgm:styleLbl name="fgShp">
+    <dgm:scene3d>
+      <a:camera prst="orthographicFront"/>
+      <a:lightRig rig="threePt" dir="t"/>
+    </dgm:scene3d>
+    <dgm:sp3d/>
+    <dgm:txPr/>
+    <dgm:style>
+      <a:lnRef idx="2">
+        <a:scrgbClr r="0" g="0" b="0"/>
+      </a:lnRef>
+      <a:fillRef idx="1">
+        <a:scrgbClr r="0" g="0" b="0"/>
+      </a:fillRef>
+      <a:effectRef idx="0">
+        <a:scrgbClr r="0" g="0" b="0"/>
+      </a:effectRef>
+      <a:fontRef idx="minor"/>
+    </dgm:style>
+  </dgm:styleLbl>
+  <dgm:styleLbl name="revTx">
+    <dgm:scene3d>
+      <a:camera prst="orthographicFront"/>
+      <a:lightRig rig="threePt" dir="t"/>
+    </dgm:scene3d>
+    <dgm:sp3d/>
+    <dgm:txPr/>
+    <dgm:style>
+      <a:lnRef idx="0">
+        <a:scrgbClr r="0" g="0" b="0"/>
+      </a:lnRef>
+      <a:fillRef idx="0">
+        <a:scrgbClr r="0" g="0" b="0"/>
+      </a:fillRef>
+      <a:effectRef idx="0">
+        <a:scrgbClr r="0" g="0" b="0"/>
+      </a:effectRef>
+      <a:fontRef idx="minor"/>
+    </dgm:style>
+  </dgm:styleLbl>
+</dgm:styleDef>
+</file>
+
+<file path=ppt/diagrams/quickStyle3.xml><?xml version="1.0" encoding="utf-8"?>
 <dgm:styleDef xmlns:dgm="http://schemas.openxmlformats.org/drawingml/2006/diagram" xmlns:a="http://schemas.openxmlformats.org/drawingml/2006/main" uniqueId="urn:microsoft.com/office/officeart/2005/8/quickstyle/simple1">
   <dgm:title val=""/>
   <dgm:desc val=""/>
@@ -9886,6 +12920,727 @@
 </file>
 
 <file path=ppt/slides/slide11.xml><?xml version="1.0" encoding="utf-8"?>
+<p:sld xmlns:a="http://schemas.openxmlformats.org/drawingml/2006/main" xmlns:r="http://schemas.openxmlformats.org/officeDocument/2006/relationships" xmlns:p="http://schemas.openxmlformats.org/presentationml/2006/main">
+  <p:cSld>
+    <p:spTree>
+      <p:nvGrpSpPr>
+        <p:cNvPr id="1" name=""/>
+        <p:cNvGrpSpPr/>
+        <p:nvPr/>
+      </p:nvGrpSpPr>
+      <p:grpSpPr>
+        <a:xfrm>
+          <a:off x="0" y="0"/>
+          <a:ext cx="0" cy="0"/>
+          <a:chOff x="0" y="0"/>
+          <a:chExt cx="0" cy="0"/>
+        </a:xfrm>
+      </p:grpSpPr>
+      <p:sp>
+        <p:nvSpPr>
+          <p:cNvPr id="2" name="Title 1">
+            <a:extLst>
+              <a:ext uri="{FF2B5EF4-FFF2-40B4-BE49-F238E27FC236}">
+                <a16:creationId xmlns:a16="http://schemas.microsoft.com/office/drawing/2014/main" id="{42DA50DF-5348-4AEC-8FCC-4B435F899112}"/>
+              </a:ext>
+            </a:extLst>
+          </p:cNvPr>
+          <p:cNvSpPr>
+            <a:spLocks noGrp="1"/>
+          </p:cNvSpPr>
+          <p:nvPr>
+            <p:ph type="title"/>
+          </p:nvPr>
+        </p:nvSpPr>
+        <p:spPr/>
+        <p:txBody>
+          <a:bodyPr/>
+          <a:lstStyle/>
+          <a:p>
+            <a:r>
+              <a:rPr lang="de-DE" dirty="0"/>
+              <a:t>Database Deep Dive</a:t>
+            </a:r>
+            <a:endParaRPr lang="en-US" dirty="0"/>
+          </a:p>
+        </p:txBody>
+      </p:sp>
+      <p:sp>
+        <p:nvSpPr>
+          <p:cNvPr id="5" name="Footer Placeholder 7">
+            <a:extLst>
+              <a:ext uri="{FF2B5EF4-FFF2-40B4-BE49-F238E27FC236}">
+                <a16:creationId xmlns:a16="http://schemas.microsoft.com/office/drawing/2014/main" id="{30498599-967D-4388-8023-1528E045B05D}"/>
+              </a:ext>
+            </a:extLst>
+          </p:cNvPr>
+          <p:cNvSpPr>
+            <a:spLocks noGrp="1"/>
+          </p:cNvSpPr>
+          <p:nvPr>
+            <p:ph type="ftr" sz="quarter" idx="11"/>
+          </p:nvPr>
+        </p:nvSpPr>
+        <p:spPr>
+          <a:xfrm>
+            <a:off x="4038600" y="6356350"/>
+            <a:ext cx="4114800" cy="365125"/>
+          </a:xfrm>
+        </p:spPr>
+        <p:txBody>
+          <a:bodyPr/>
+          <a:lstStyle/>
+          <a:p>
+            <a:r>
+              <a:rPr lang="en-US" dirty="0"/>
+              <a:t>1st of December 2021</a:t>
+            </a:r>
+          </a:p>
+        </p:txBody>
+      </p:sp>
+      <p:sp>
+        <p:nvSpPr>
+          <p:cNvPr id="11" name="TextBox 10">
+            <a:extLst>
+              <a:ext uri="{FF2B5EF4-FFF2-40B4-BE49-F238E27FC236}">
+                <a16:creationId xmlns:a16="http://schemas.microsoft.com/office/drawing/2014/main" id="{7CDD0A1F-C01B-4059-A6F2-A6F7EC63A611}"/>
+              </a:ext>
+            </a:extLst>
+          </p:cNvPr>
+          <p:cNvSpPr txBox="1"/>
+          <p:nvPr/>
+        </p:nvSpPr>
+        <p:spPr>
+          <a:xfrm>
+            <a:off x="972457" y="1277257"/>
+            <a:ext cx="1529137" cy="369332"/>
+          </a:xfrm>
+          <a:prstGeom prst="rect">
+            <a:avLst/>
+          </a:prstGeom>
+          <a:noFill/>
+        </p:spPr>
+        <p:txBody>
+          <a:bodyPr wrap="none" rtlCol="0">
+            <a:spAutoFit/>
+          </a:bodyPr>
+          <a:lstStyle/>
+          <a:p>
+            <a:r>
+              <a:rPr lang="de-DE" dirty="0" err="1"/>
+              <a:t>Current</a:t>
+            </a:r>
+            <a:r>
+              <a:rPr lang="de-DE" dirty="0"/>
+              <a:t> Status</a:t>
+            </a:r>
+            <a:endParaRPr lang="en-US" dirty="0"/>
+          </a:p>
+        </p:txBody>
+      </p:sp>
+      <p:graphicFrame>
+        <p:nvGraphicFramePr>
+          <p:cNvPr id="18" name="Diagram 17">
+            <a:extLst>
+              <a:ext uri="{FF2B5EF4-FFF2-40B4-BE49-F238E27FC236}">
+                <a16:creationId xmlns:a16="http://schemas.microsoft.com/office/drawing/2014/main" id="{E390AE96-0D7D-47EB-8E18-CB2A70E032DF}"/>
+              </a:ext>
+            </a:extLst>
+          </p:cNvPr>
+          <p:cNvGraphicFramePr/>
+          <p:nvPr>
+            <p:extLst>
+              <p:ext uri="{D42A27DB-BD31-4B8C-83A1-F6EECF244321}">
+                <p14:modId xmlns:p14="http://schemas.microsoft.com/office/powerpoint/2010/main" val="2875954069"/>
+              </p:ext>
+            </p:extLst>
+          </p:nvPr>
+        </p:nvGraphicFramePr>
+        <p:xfrm>
+          <a:off x="838200" y="719666"/>
+          <a:ext cx="8128000" cy="5418667"/>
+        </p:xfrm>
+        <a:graphic>
+          <a:graphicData uri="http://schemas.openxmlformats.org/drawingml/2006/diagram">
+            <dgm:relIds xmlns:dgm="http://schemas.openxmlformats.org/drawingml/2006/diagram" xmlns:r="http://schemas.openxmlformats.org/officeDocument/2006/relationships" r:dm="rId2" r:lo="rId3" r:qs="rId4" r:cs="rId5"/>
+          </a:graphicData>
+        </a:graphic>
+      </p:graphicFrame>
+      <p:sp>
+        <p:nvSpPr>
+          <p:cNvPr id="20" name="Speech Bubble: Rectangle 19">
+            <a:extLst>
+              <a:ext uri="{FF2B5EF4-FFF2-40B4-BE49-F238E27FC236}">
+                <a16:creationId xmlns:a16="http://schemas.microsoft.com/office/drawing/2014/main" id="{7D385682-6B6F-4C87-BF65-21B1B67FAF9A}"/>
+              </a:ext>
+            </a:extLst>
+          </p:cNvPr>
+          <p:cNvSpPr/>
+          <p:nvPr/>
+        </p:nvSpPr>
+        <p:spPr>
+          <a:xfrm>
+            <a:off x="3372928" y="4359244"/>
+            <a:ext cx="1656272" cy="756219"/>
+          </a:xfrm>
+          <a:prstGeom prst="wedgeRectCallout">
+            <a:avLst>
+              <a:gd name="adj1" fmla="val 35328"/>
+              <a:gd name="adj2" fmla="val -96112"/>
+            </a:avLst>
+          </a:prstGeom>
+          <a:solidFill>
+            <a:schemeClr val="bg1">
+              <a:lumMod val="85000"/>
+            </a:schemeClr>
+          </a:solidFill>
+          <a:ln>
+            <a:solidFill>
+              <a:srgbClr val="002060"/>
+            </a:solidFill>
+          </a:ln>
+        </p:spPr>
+        <p:style>
+          <a:lnRef idx="2">
+            <a:schemeClr val="accent1">
+              <a:shade val="50000"/>
+            </a:schemeClr>
+          </a:lnRef>
+          <a:fillRef idx="1">
+            <a:schemeClr val="accent1"/>
+          </a:fillRef>
+          <a:effectRef idx="0">
+            <a:schemeClr val="accent1"/>
+          </a:effectRef>
+          <a:fontRef idx="minor">
+            <a:schemeClr val="lt1"/>
+          </a:fontRef>
+        </p:style>
+        <p:txBody>
+          <a:bodyPr rtlCol="0" anchor="ctr"/>
+          <a:lstStyle/>
+          <a:p>
+            <a:pPr algn="ctr"/>
+            <a:r>
+              <a:rPr lang="de-DE" sz="1400" dirty="0" err="1">
+                <a:solidFill>
+                  <a:sysClr val="windowText" lastClr="000000"/>
+                </a:solidFill>
+              </a:rPr>
+              <a:t>Finalize</a:t>
+            </a:r>
+            <a:r>
+              <a:rPr lang="de-DE" sz="1400" dirty="0">
+                <a:solidFill>
+                  <a:sysClr val="windowText" lastClr="000000"/>
+                </a:solidFill>
+              </a:rPr>
+              <a:t> data </a:t>
+            </a:r>
+            <a:r>
+              <a:rPr lang="de-DE" sz="1400" dirty="0" err="1">
+                <a:solidFill>
+                  <a:sysClr val="windowText" lastClr="000000"/>
+                </a:solidFill>
+              </a:rPr>
+              <a:t>pipelines</a:t>
+            </a:r>
+            <a:r>
+              <a:rPr lang="de-DE" sz="1400" dirty="0">
+                <a:solidFill>
+                  <a:sysClr val="windowText" lastClr="000000"/>
+                </a:solidFill>
+              </a:rPr>
+              <a:t> </a:t>
+            </a:r>
+            <a:r>
+              <a:rPr lang="de-DE" sz="1400" dirty="0" err="1">
+                <a:solidFill>
+                  <a:sysClr val="windowText" lastClr="000000"/>
+                </a:solidFill>
+              </a:rPr>
+              <a:t>with</a:t>
+            </a:r>
+            <a:r>
+              <a:rPr lang="de-DE" sz="1400" dirty="0">
+                <a:solidFill>
+                  <a:sysClr val="windowText" lastClr="000000"/>
+                </a:solidFill>
+              </a:rPr>
+              <a:t> </a:t>
+            </a:r>
+            <a:r>
+              <a:rPr lang="de-DE" sz="1400" dirty="0" err="1">
+                <a:solidFill>
+                  <a:sysClr val="windowText" lastClr="000000"/>
+                </a:solidFill>
+              </a:rPr>
+              <a:t>new</a:t>
+            </a:r>
+            <a:r>
+              <a:rPr lang="de-DE" sz="1400" dirty="0">
+                <a:solidFill>
+                  <a:sysClr val="windowText" lastClr="000000"/>
+                </a:solidFill>
+              </a:rPr>
+              <a:t> </a:t>
+            </a:r>
+            <a:r>
+              <a:rPr lang="de-DE" sz="1400" dirty="0" err="1">
+                <a:solidFill>
+                  <a:sysClr val="windowText" lastClr="000000"/>
+                </a:solidFill>
+              </a:rPr>
+              <a:t>input</a:t>
+            </a:r>
+            <a:endParaRPr lang="en-US" sz="1400" dirty="0">
+              <a:solidFill>
+                <a:sysClr val="windowText" lastClr="000000"/>
+              </a:solidFill>
+            </a:endParaRPr>
+          </a:p>
+        </p:txBody>
+      </p:sp>
+      <p:sp>
+        <p:nvSpPr>
+          <p:cNvPr id="21" name="Speech Bubble: Rectangle 20">
+            <a:extLst>
+              <a:ext uri="{FF2B5EF4-FFF2-40B4-BE49-F238E27FC236}">
+                <a16:creationId xmlns:a16="http://schemas.microsoft.com/office/drawing/2014/main" id="{E0BFF93B-E620-473F-BB4D-D4E21B010E53}"/>
+              </a:ext>
+            </a:extLst>
+          </p:cNvPr>
+          <p:cNvSpPr/>
+          <p:nvPr/>
+        </p:nvSpPr>
+        <p:spPr>
+          <a:xfrm>
+            <a:off x="6701526" y="4471388"/>
+            <a:ext cx="1656272" cy="756219"/>
+          </a:xfrm>
+          <a:prstGeom prst="wedgeRectCallout">
+            <a:avLst>
+              <a:gd name="adj1" fmla="val 35328"/>
+              <a:gd name="adj2" fmla="val -96112"/>
+            </a:avLst>
+          </a:prstGeom>
+          <a:solidFill>
+            <a:schemeClr val="bg1">
+              <a:lumMod val="85000"/>
+            </a:schemeClr>
+          </a:solidFill>
+          <a:ln>
+            <a:solidFill>
+              <a:srgbClr val="002060"/>
+            </a:solidFill>
+          </a:ln>
+        </p:spPr>
+        <p:style>
+          <a:lnRef idx="2">
+            <a:schemeClr val="accent1">
+              <a:shade val="50000"/>
+            </a:schemeClr>
+          </a:lnRef>
+          <a:fillRef idx="1">
+            <a:schemeClr val="accent1"/>
+          </a:fillRef>
+          <a:effectRef idx="0">
+            <a:schemeClr val="accent1"/>
+          </a:effectRef>
+          <a:fontRef idx="minor">
+            <a:schemeClr val="lt1"/>
+          </a:fontRef>
+        </p:style>
+        <p:txBody>
+          <a:bodyPr rtlCol="0" anchor="ctr"/>
+          <a:lstStyle/>
+          <a:p>
+            <a:pPr algn="ctr"/>
+            <a:r>
+              <a:rPr lang="de-DE" sz="1400" dirty="0" err="1">
+                <a:solidFill>
+                  <a:sysClr val="windowText" lastClr="000000"/>
+                </a:solidFill>
+              </a:rPr>
+              <a:t>Map</a:t>
+            </a:r>
+            <a:r>
+              <a:rPr lang="de-DE" sz="1400" dirty="0">
+                <a:solidFill>
+                  <a:sysClr val="windowText" lastClr="000000"/>
+                </a:solidFill>
+              </a:rPr>
+              <a:t> </a:t>
+            </a:r>
+            <a:r>
+              <a:rPr lang="de-DE" sz="1400" dirty="0" err="1">
+                <a:solidFill>
+                  <a:sysClr val="windowText" lastClr="000000"/>
+                </a:solidFill>
+              </a:rPr>
+              <a:t>finalized</a:t>
+            </a:r>
+            <a:r>
+              <a:rPr lang="de-DE" sz="1400" dirty="0">
+                <a:solidFill>
+                  <a:sysClr val="windowText" lastClr="000000"/>
+                </a:solidFill>
+              </a:rPr>
+              <a:t> </a:t>
+            </a:r>
+            <a:r>
+              <a:rPr lang="de-DE" sz="1400" dirty="0" err="1">
+                <a:solidFill>
+                  <a:sysClr val="windowText" lastClr="000000"/>
+                </a:solidFill>
+              </a:rPr>
+              <a:t>information</a:t>
+            </a:r>
+            <a:r>
+              <a:rPr lang="de-DE" sz="1400" dirty="0">
+                <a:solidFill>
+                  <a:sysClr val="windowText" lastClr="000000"/>
+                </a:solidFill>
+              </a:rPr>
+              <a:t> to database </a:t>
+            </a:r>
+            <a:r>
+              <a:rPr lang="de-DE" sz="1400" dirty="0" err="1">
+                <a:solidFill>
+                  <a:sysClr val="windowText" lastClr="000000"/>
+                </a:solidFill>
+              </a:rPr>
+              <a:t>structure</a:t>
+            </a:r>
+            <a:endParaRPr lang="en-US" sz="1400" dirty="0">
+              <a:solidFill>
+                <a:sysClr val="windowText" lastClr="000000"/>
+              </a:solidFill>
+            </a:endParaRPr>
+          </a:p>
+        </p:txBody>
+      </p:sp>
+      <p:sp>
+        <p:nvSpPr>
+          <p:cNvPr id="22" name="Rectangle: Rounded Corners 21">
+            <a:extLst>
+              <a:ext uri="{FF2B5EF4-FFF2-40B4-BE49-F238E27FC236}">
+                <a16:creationId xmlns:a16="http://schemas.microsoft.com/office/drawing/2014/main" id="{D073FE53-5AC1-4E6D-BF02-9C1A8F2ABB41}"/>
+              </a:ext>
+            </a:extLst>
+          </p:cNvPr>
+          <p:cNvSpPr/>
+          <p:nvPr/>
+        </p:nvSpPr>
+        <p:spPr>
+          <a:xfrm>
+            <a:off x="9180285" y="2766218"/>
+            <a:ext cx="2561773" cy="1325563"/>
+          </a:xfrm>
+          <a:prstGeom prst="roundRect">
+            <a:avLst/>
+          </a:prstGeom>
+          <a:solidFill>
+            <a:srgbClr val="B4C7E7"/>
+          </a:solidFill>
+        </p:spPr>
+        <p:style>
+          <a:lnRef idx="2">
+            <a:schemeClr val="accent1">
+              <a:shade val="50000"/>
+            </a:schemeClr>
+          </a:lnRef>
+          <a:fillRef idx="1">
+            <a:schemeClr val="accent1"/>
+          </a:fillRef>
+          <a:effectRef idx="0">
+            <a:schemeClr val="accent1"/>
+          </a:effectRef>
+          <a:fontRef idx="minor">
+            <a:schemeClr val="lt1"/>
+          </a:fontRef>
+        </p:style>
+        <p:txBody>
+          <a:bodyPr rtlCol="0" anchor="ctr"/>
+          <a:lstStyle/>
+          <a:p>
+            <a:pPr algn="ctr"/>
+            <a:r>
+              <a:rPr lang="de-DE" sz="2400" b="1" dirty="0"/>
+              <a:t>Structured data in database</a:t>
+            </a:r>
+            <a:endParaRPr lang="en-US" sz="2400" b="1" dirty="0"/>
+          </a:p>
+        </p:txBody>
+      </p:sp>
+      <p:sp>
+        <p:nvSpPr>
+          <p:cNvPr id="23" name="Speech Bubble: Rectangle 22">
+            <a:extLst>
+              <a:ext uri="{FF2B5EF4-FFF2-40B4-BE49-F238E27FC236}">
+                <a16:creationId xmlns:a16="http://schemas.microsoft.com/office/drawing/2014/main" id="{DC84D6FB-51B4-405E-9717-2CF7C2B6BB0D}"/>
+              </a:ext>
+            </a:extLst>
+          </p:cNvPr>
+          <p:cNvSpPr/>
+          <p:nvPr/>
+        </p:nvSpPr>
+        <p:spPr>
+          <a:xfrm>
+            <a:off x="9405668" y="1690688"/>
+            <a:ext cx="1656272" cy="756219"/>
+          </a:xfrm>
+          <a:prstGeom prst="wedgeRectCallout">
+            <a:avLst>
+              <a:gd name="adj1" fmla="val 44182"/>
+              <a:gd name="adj2" fmla="val 96671"/>
+            </a:avLst>
+          </a:prstGeom>
+          <a:solidFill>
+            <a:schemeClr val="bg1">
+              <a:lumMod val="85000"/>
+            </a:schemeClr>
+          </a:solidFill>
+          <a:ln>
+            <a:solidFill>
+              <a:srgbClr val="002060"/>
+            </a:solidFill>
+          </a:ln>
+        </p:spPr>
+        <p:style>
+          <a:lnRef idx="2">
+            <a:schemeClr val="accent1">
+              <a:shade val="50000"/>
+            </a:schemeClr>
+          </a:lnRef>
+          <a:fillRef idx="1">
+            <a:schemeClr val="accent1"/>
+          </a:fillRef>
+          <a:effectRef idx="0">
+            <a:schemeClr val="accent1"/>
+          </a:effectRef>
+          <a:fontRef idx="minor">
+            <a:schemeClr val="lt1"/>
+          </a:fontRef>
+        </p:style>
+        <p:txBody>
+          <a:bodyPr rtlCol="0" anchor="ctr"/>
+          <a:lstStyle/>
+          <a:p>
+            <a:pPr algn="ctr"/>
+            <a:r>
+              <a:rPr lang="de-DE" sz="1400" dirty="0" err="1">
+                <a:solidFill>
+                  <a:sysClr val="windowText" lastClr="000000"/>
+                </a:solidFill>
+              </a:rPr>
+              <a:t>Structure</a:t>
+            </a:r>
+            <a:r>
+              <a:rPr lang="de-DE" sz="1400" dirty="0">
+                <a:solidFill>
+                  <a:sysClr val="windowText" lastClr="000000"/>
+                </a:solidFill>
+              </a:rPr>
+              <a:t> </a:t>
+            </a:r>
+            <a:r>
+              <a:rPr lang="de-DE" sz="1400" dirty="0" err="1">
+                <a:solidFill>
+                  <a:sysClr val="windowText" lastClr="000000"/>
+                </a:solidFill>
+              </a:rPr>
+              <a:t>created</a:t>
+            </a:r>
+            <a:r>
+              <a:rPr lang="de-DE" sz="1400" dirty="0">
+                <a:solidFill>
+                  <a:sysClr val="windowText" lastClr="000000"/>
+                </a:solidFill>
+              </a:rPr>
+              <a:t> (in SQL) – </a:t>
+            </a:r>
+            <a:r>
+              <a:rPr lang="de-DE" sz="1400" dirty="0" err="1">
+                <a:solidFill>
+                  <a:sysClr val="windowText" lastClr="000000"/>
+                </a:solidFill>
+              </a:rPr>
+              <a:t>needs</a:t>
+            </a:r>
+            <a:r>
+              <a:rPr lang="de-DE" sz="1400" dirty="0">
+                <a:solidFill>
+                  <a:sysClr val="windowText" lastClr="000000"/>
+                </a:solidFill>
+              </a:rPr>
+              <a:t> to </a:t>
+            </a:r>
+            <a:r>
+              <a:rPr lang="de-DE" sz="1400" dirty="0" err="1">
+                <a:solidFill>
+                  <a:sysClr val="windowText" lastClr="000000"/>
+                </a:solidFill>
+              </a:rPr>
+              <a:t>be</a:t>
+            </a:r>
+            <a:r>
+              <a:rPr lang="de-DE" sz="1400" dirty="0">
+                <a:solidFill>
+                  <a:sysClr val="windowText" lastClr="000000"/>
+                </a:solidFill>
+              </a:rPr>
+              <a:t> </a:t>
+            </a:r>
+            <a:r>
+              <a:rPr lang="de-DE" sz="1400" dirty="0" err="1">
+                <a:solidFill>
+                  <a:sysClr val="windowText" lastClr="000000"/>
+                </a:solidFill>
+              </a:rPr>
+              <a:t>filled</a:t>
+            </a:r>
+            <a:endParaRPr lang="en-US" sz="1400" dirty="0">
+              <a:solidFill>
+                <a:sysClr val="windowText" lastClr="000000"/>
+              </a:solidFill>
+            </a:endParaRPr>
+          </a:p>
+        </p:txBody>
+      </p:sp>
+      <p:sp>
+        <p:nvSpPr>
+          <p:cNvPr id="24" name="Speech Bubble: Rectangle 23">
+            <a:extLst>
+              <a:ext uri="{FF2B5EF4-FFF2-40B4-BE49-F238E27FC236}">
+                <a16:creationId xmlns:a16="http://schemas.microsoft.com/office/drawing/2014/main" id="{CD951594-4EAB-4CDE-B048-8193FF72D9AD}"/>
+              </a:ext>
+            </a:extLst>
+          </p:cNvPr>
+          <p:cNvSpPr/>
+          <p:nvPr/>
+        </p:nvSpPr>
+        <p:spPr>
+          <a:xfrm>
+            <a:off x="449292" y="4363172"/>
+            <a:ext cx="1656272" cy="756219"/>
+          </a:xfrm>
+          <a:prstGeom prst="wedgeRectCallout">
+            <a:avLst>
+              <a:gd name="adj1" fmla="val 35328"/>
+              <a:gd name="adj2" fmla="val -96112"/>
+            </a:avLst>
+          </a:prstGeom>
+          <a:solidFill>
+            <a:schemeClr val="bg1">
+              <a:lumMod val="85000"/>
+            </a:schemeClr>
+          </a:solidFill>
+          <a:ln>
+            <a:solidFill>
+              <a:srgbClr val="002060"/>
+            </a:solidFill>
+          </a:ln>
+        </p:spPr>
+        <p:style>
+          <a:lnRef idx="2">
+            <a:schemeClr val="accent1">
+              <a:shade val="50000"/>
+            </a:schemeClr>
+          </a:lnRef>
+          <a:fillRef idx="1">
+            <a:schemeClr val="accent1"/>
+          </a:fillRef>
+          <a:effectRef idx="0">
+            <a:schemeClr val="accent1"/>
+          </a:effectRef>
+          <a:fontRef idx="minor">
+            <a:schemeClr val="lt1"/>
+          </a:fontRef>
+        </p:style>
+        <p:txBody>
+          <a:bodyPr rtlCol="0" anchor="ctr"/>
+          <a:lstStyle/>
+          <a:p>
+            <a:pPr algn="ctr"/>
+            <a:r>
+              <a:rPr lang="de-DE" sz="1400" dirty="0">
+                <a:solidFill>
+                  <a:sysClr val="windowText" lastClr="000000"/>
+                </a:solidFill>
+              </a:rPr>
+              <a:t>Applied </a:t>
+            </a:r>
+            <a:r>
+              <a:rPr lang="de-DE" sz="1400" dirty="0" err="1">
+                <a:solidFill>
+                  <a:sysClr val="windowText" lastClr="000000"/>
+                </a:solidFill>
+              </a:rPr>
+              <a:t>existing</a:t>
+            </a:r>
+            <a:r>
+              <a:rPr lang="de-DE" sz="1400" dirty="0">
+                <a:solidFill>
+                  <a:sysClr val="windowText" lastClr="000000"/>
+                </a:solidFill>
+              </a:rPr>
+              <a:t> </a:t>
+            </a:r>
+            <a:r>
+              <a:rPr lang="de-DE" sz="1400" dirty="0" err="1">
+                <a:solidFill>
+                  <a:sysClr val="windowText" lastClr="000000"/>
+                </a:solidFill>
+              </a:rPr>
+              <a:t>pipelines</a:t>
+            </a:r>
+            <a:r>
+              <a:rPr lang="de-DE" sz="1400" dirty="0">
+                <a:solidFill>
+                  <a:sysClr val="windowText" lastClr="000000"/>
+                </a:solidFill>
+              </a:rPr>
+              <a:t> to </a:t>
+            </a:r>
+            <a:r>
+              <a:rPr lang="de-DE" sz="1400" dirty="0" err="1">
+                <a:solidFill>
+                  <a:sysClr val="windowText" lastClr="000000"/>
+                </a:solidFill>
+              </a:rPr>
+              <a:t>new</a:t>
+            </a:r>
+            <a:r>
+              <a:rPr lang="de-DE" sz="1400" dirty="0">
+                <a:solidFill>
+                  <a:sysClr val="windowText" lastClr="000000"/>
+                </a:solidFill>
+              </a:rPr>
+              <a:t> data</a:t>
+            </a:r>
+            <a:endParaRPr lang="en-US" sz="1400" dirty="0">
+              <a:solidFill>
+                <a:sysClr val="windowText" lastClr="000000"/>
+              </a:solidFill>
+            </a:endParaRPr>
+          </a:p>
+        </p:txBody>
+      </p:sp>
+    </p:spTree>
+    <p:extLst>
+      <p:ext uri="{BB962C8B-B14F-4D97-AF65-F5344CB8AC3E}">
+        <p14:creationId xmlns:p14="http://schemas.microsoft.com/office/powerpoint/2010/main" val="3063784307"/>
+      </p:ext>
+    </p:extLst>
+  </p:cSld>
+  <p:clrMapOvr>
+    <a:masterClrMapping/>
+  </p:clrMapOvr>
+</p:sld>
+</file>
+
+<file path=ppt/slides/slide12.xml><?xml version="1.0" encoding="utf-8"?>
 <p:sld xmlns:a="http://schemas.openxmlformats.org/drawingml/2006/main" xmlns:r="http://schemas.openxmlformats.org/officeDocument/2006/relationships" xmlns:p="http://schemas.openxmlformats.org/presentationml/2006/main">
   <p:cSld>
     <p:spTree>
@@ -11289,13 +15044,13 @@
           <p:nvPr>
             <p:extLst>
               <p:ext uri="{D42A27DB-BD31-4B8C-83A1-F6EECF244321}">
-                <p14:modId xmlns:p14="http://schemas.microsoft.com/office/powerpoint/2010/main" val="3608905352"/>
+                <p14:modId xmlns:p14="http://schemas.microsoft.com/office/powerpoint/2010/main" val="2085455333"/>
               </p:ext>
             </p:extLst>
           </p:nvPr>
         </p:nvGraphicFramePr>
         <p:xfrm>
-          <a:off x="2032000" y="1690688"/>
+          <a:off x="2045508" y="1690688"/>
           <a:ext cx="8723086" cy="4447645"/>
         </p:xfrm>
         <a:graphic>

</xml_diff>